<commit_message>
Updated Draft of Presentation
</commit_message>
<xml_diff>
--- a/Project Presentation Draft.pptx
+++ b/Project Presentation Draft.pptx
@@ -3631,10 +3631,10 @@
         </p:nvGrpSpPr>
         <p:grpSpPr>
           <a:xfrm rot="0">
-            <a:off x="-152807" y="3505117"/>
-            <a:ext cx="18688947" cy="3721654"/>
+            <a:off x="8726356" y="-1898039"/>
+            <a:ext cx="9981859" cy="13795182"/>
             <a:chOff x="0" y="0"/>
-            <a:chExt cx="4922192" cy="980189"/>
+            <a:chExt cx="2628967" cy="3633299"/>
           </a:xfrm>
         </p:grpSpPr>
         <p:sp>
@@ -3646,7 +3646,7 @@
           <p:spPr>
             <a:xfrm flipH="false" flipV="false" rot="0">
               <a:off x="0" y="0"/>
-              <a:ext cx="4922192" cy="980189"/>
+              <a:ext cx="2628967" cy="3633299"/>
             </a:xfrm>
             <a:custGeom>
               <a:avLst/>
@@ -3655,18 +3655,18 @@
               <a:cxnLst/>
               <a:rect r="r" b="b" t="t" l="l"/>
               <a:pathLst>
-                <a:path h="980189" w="4922192">
+                <a:path h="3633299" w="2628967">
                   <a:moveTo>
                     <a:pt x="0" y="0"/>
                   </a:moveTo>
                   <a:lnTo>
-                    <a:pt x="4922192" y="0"/>
+                    <a:pt x="2628967" y="0"/>
                   </a:lnTo>
                   <a:lnTo>
-                    <a:pt x="4922192" y="980189"/>
+                    <a:pt x="2628967" y="3633299"/>
                   </a:lnTo>
                   <a:lnTo>
-                    <a:pt x="0" y="980189"/>
+                    <a:pt x="0" y="3633299"/>
                   </a:lnTo>
                   <a:close/>
                 </a:path>
@@ -3698,7 +3698,7 @@
           <p:spPr>
             <a:xfrm>
               <a:off x="0" y="28575"/>
-              <a:ext cx="4922192" cy="951614"/>
+              <a:ext cx="2628967" cy="3604724"/>
             </a:xfrm>
             <a:prstGeom prst="rect">
               <a:avLst/>
@@ -3719,14 +3719,124 @@
       </p:grpSp>
       <p:sp>
         <p:nvSpPr>
-          <p:cNvPr name="TextBox 6" id="6"/>
+          <p:cNvPr name="Freeform 6" id="6"/>
+          <p:cNvSpPr/>
+          <p:nvPr/>
+        </p:nvSpPr>
+        <p:spPr>
+          <a:xfrm flipH="false" flipV="false" rot="-5400000">
+            <a:off x="1300272" y="3327963"/>
+            <a:ext cx="7421720" cy="5573037"/>
+          </a:xfrm>
+          <a:custGeom>
+            <a:avLst/>
+            <a:gdLst/>
+            <a:ahLst/>
+            <a:cxnLst/>
+            <a:rect r="r" b="b" t="t" l="l"/>
+            <a:pathLst>
+              <a:path h="5573037" w="7421720">
+                <a:moveTo>
+                  <a:pt x="0" y="0"/>
+                </a:moveTo>
+                <a:lnTo>
+                  <a:pt x="7421719" y="0"/>
+                </a:lnTo>
+                <a:lnTo>
+                  <a:pt x="7421719" y="5573036"/>
+                </a:lnTo>
+                <a:lnTo>
+                  <a:pt x="0" y="5573036"/>
+                </a:lnTo>
+                <a:lnTo>
+                  <a:pt x="0" y="0"/>
+                </a:lnTo>
+                <a:close/>
+              </a:path>
+            </a:pathLst>
+          </a:custGeom>
+          <a:blipFill>
+            <a:blip r:embed="rId4">
+              <a:extLst>
+                <a:ext uri="{96DAC541-7B7A-43D3-8B79-37D633B846F1}">
+                  <asvg:svgBlip xmlns:asvg="http://schemas.microsoft.com/office/drawing/2016/SVG/main" r:embed="rId5"/>
+                </a:ext>
+              </a:extLst>
+            </a:blip>
+            <a:stretch>
+              <a:fillRect l="0" t="0" r="0" b="0"/>
+            </a:stretch>
+          </a:blipFill>
+        </p:spPr>
+      </p:sp>
+      <p:grpSp>
+        <p:nvGrpSpPr>
+          <p:cNvPr name="Group 7" id="7"/>
+          <p:cNvGrpSpPr/>
+          <p:nvPr/>
+        </p:nvGrpSpPr>
+        <p:grpSpPr>
+          <a:xfrm rot="0">
+            <a:off x="2925279" y="3122331"/>
+            <a:ext cx="4261262" cy="6013018"/>
+            <a:chOff x="0" y="0"/>
+            <a:chExt cx="660181" cy="931574"/>
+          </a:xfrm>
+        </p:grpSpPr>
+        <p:sp>
+          <p:nvSpPr>
+            <p:cNvPr name="Freeform 8" id="8"/>
+            <p:cNvSpPr/>
+            <p:nvPr/>
+          </p:nvSpPr>
+          <p:spPr>
+            <a:xfrm flipH="false" flipV="false" rot="0">
+              <a:off x="0" y="0"/>
+              <a:ext cx="660181" cy="931574"/>
+            </a:xfrm>
+            <a:custGeom>
+              <a:avLst/>
+              <a:gdLst/>
+              <a:ahLst/>
+              <a:cxnLst/>
+              <a:rect r="r" b="b" t="t" l="l"/>
+              <a:pathLst>
+                <a:path h="931574" w="660181">
+                  <a:moveTo>
+                    <a:pt x="0" y="0"/>
+                  </a:moveTo>
+                  <a:lnTo>
+                    <a:pt x="660181" y="0"/>
+                  </a:lnTo>
+                  <a:lnTo>
+                    <a:pt x="660181" y="931574"/>
+                  </a:lnTo>
+                  <a:lnTo>
+                    <a:pt x="0" y="931574"/>
+                  </a:lnTo>
+                  <a:close/>
+                </a:path>
+              </a:pathLst>
+            </a:custGeom>
+            <a:blipFill>
+              <a:blip r:embed="rId6"/>
+              <a:stretch>
+                <a:fillRect l="-44072" t="0" r="-44072" b="0"/>
+              </a:stretch>
+            </a:blipFill>
+          </p:spPr>
+        </p:sp>
+      </p:grpSp>
+      <p:sp>
+        <p:nvSpPr>
+          <p:cNvPr name="TextBox 9" id="9"/>
           <p:cNvSpPr txBox="true"/>
           <p:nvPr/>
         </p:nvSpPr>
         <p:spPr>
           <a:xfrm rot="0">
-            <a:off x="4111353" y="3864215"/>
-            <a:ext cx="11556954" cy="3884691"/>
+            <a:off x="9449807" y="2163114"/>
+            <a:ext cx="7616279" cy="1167826"/>
           </a:xfrm>
           <a:prstGeom prst="rect">
             <a:avLst/>
@@ -3738,264 +3848,7 @@
           </a:bodyPr>
           <a:lstStyle/>
           <a:p>
-            <a:pPr algn="ctr">
-              <a:lnSpc>
-                <a:spcPts val="2181"/>
-              </a:lnSpc>
-            </a:pPr>
-            <a:r>
-              <a:rPr lang="en-US" sz="2058" b="true">
-                <a:solidFill>
-                  <a:srgbClr val="FFFFFF"/>
-                </a:solidFill>
-                <a:latin typeface="Raleway Semi-Bold"/>
-                <a:ea typeface="Raleway Semi-Bold"/>
-                <a:cs typeface="Raleway Semi-Bold"/>
-                <a:sym typeface="Raleway Semi-Bold"/>
-              </a:rPr>
-              <a:t>Jho, H. &amp; Ha, M. (2024) Towards effective argumentation: Design and implementation of a generative AI-based evaluation and feedback. </a:t>
-            </a:r>
-            <a:r>
-              <a:rPr lang="en-US" b="true" sz="2058" i="true">
-                <a:solidFill>
-                  <a:srgbClr val="FFFFFF"/>
-                </a:solidFill>
-                <a:latin typeface="Raleway Semi-Bold Italics"/>
-                <a:ea typeface="Raleway Semi-Bold Italics"/>
-                <a:cs typeface="Raleway Semi-Bold Italics"/>
-                <a:sym typeface="Raleway Semi-Bold Italics"/>
-              </a:rPr>
-              <a:t>Journal of Baltic Science Education, 23</a:t>
-            </a:r>
-            <a:r>
-              <a:rPr lang="en-US" sz="2058" b="true">
-                <a:solidFill>
-                  <a:srgbClr val="FFFFFF"/>
-                </a:solidFill>
-                <a:latin typeface="Raleway Semi-Bold"/>
-                <a:ea typeface="Raleway Semi-Bold"/>
-                <a:cs typeface="Raleway Semi-Bold"/>
-                <a:sym typeface="Raleway Semi-Bold"/>
-              </a:rPr>
-              <a:t>(2), 280-291. </a:t>
-            </a:r>
-            <a:r>
-              <a:rPr lang="en-US" b="true" sz="2058" u="sng">
-                <a:solidFill>
-                  <a:srgbClr val="FFFFFF"/>
-                </a:solidFill>
-                <a:latin typeface="Raleway Semi-Bold"/>
-                <a:ea typeface="Raleway Semi-Bold"/>
-                <a:cs typeface="Raleway Semi-Bold"/>
-                <a:sym typeface="Raleway Semi-Bold"/>
-                <a:hlinkClick r:id="rId4" tooltip="https://doi.org/10.33225/jbse/24.23.280"/>
-              </a:rPr>
-              <a:t>https://doi.org/10.33225/jbse/24.23.280</a:t>
-            </a:r>
-            <a:r>
-              <a:rPr lang="en-US" sz="2058" b="true">
-                <a:solidFill>
-                  <a:srgbClr val="FFFFFF"/>
-                </a:solidFill>
-                <a:latin typeface="Raleway Semi-Bold"/>
-                <a:ea typeface="Raleway Semi-Bold"/>
-                <a:cs typeface="Raleway Semi-Bold"/>
-                <a:sym typeface="Raleway Semi-Bold"/>
-              </a:rPr>
-              <a:t> </a:t>
-            </a:r>
-          </a:p>
-          <a:p>
-            <a:pPr algn="ctr">
-              <a:lnSpc>
-                <a:spcPts val="2181"/>
-              </a:lnSpc>
-            </a:pPr>
-          </a:p>
-          <a:p>
-            <a:pPr algn="ctr">
-              <a:lnSpc>
-                <a:spcPts val="2181"/>
-              </a:lnSpc>
-            </a:pPr>
-            <a:r>
-              <a:rPr lang="en-US" sz="2058" b="true">
-                <a:solidFill>
-                  <a:srgbClr val="FFFFFF"/>
-                </a:solidFill>
-                <a:latin typeface="Raleway Semi-Bold"/>
-                <a:ea typeface="Raleway Semi-Bold"/>
-                <a:cs typeface="Raleway Semi-Bold"/>
-                <a:sym typeface="Raleway Semi-Bold"/>
-              </a:rPr>
-              <a:t>Jurgensmeier, L. &amp; Skiera, B. (2024). Generative AI for scalable feedback to multimodal exercises. </a:t>
-            </a:r>
-            <a:r>
-              <a:rPr lang="en-US" b="true" sz="2058" i="true">
-                <a:solidFill>
-                  <a:srgbClr val="FFFFFF"/>
-                </a:solidFill>
-                <a:latin typeface="Raleway Semi-Bold Italics"/>
-                <a:ea typeface="Raleway Semi-Bold Italics"/>
-                <a:cs typeface="Raleway Semi-Bold Italics"/>
-                <a:sym typeface="Raleway Semi-Bold Italics"/>
-              </a:rPr>
-              <a:t>International Journal of Research in Marketing</a:t>
-            </a:r>
-            <a:r>
-              <a:rPr lang="en-US" sz="2058" b="true">
-                <a:solidFill>
-                  <a:srgbClr val="FFFFFF"/>
-                </a:solidFill>
-                <a:latin typeface="Raleway Semi-Bold"/>
-                <a:ea typeface="Raleway Semi-Bold"/>
-                <a:cs typeface="Raleway Semi-Bold"/>
-                <a:sym typeface="Raleway Semi-Bold"/>
-              </a:rPr>
-              <a:t>. 41, 468-488. </a:t>
-            </a:r>
-            <a:r>
-              <a:rPr lang="en-US" b="true" sz="2058" u="sng">
-                <a:solidFill>
-                  <a:srgbClr val="FFFFFF"/>
-                </a:solidFill>
-                <a:latin typeface="Raleway Semi-Bold"/>
-                <a:ea typeface="Raleway Semi-Bold"/>
-                <a:cs typeface="Raleway Semi-Bold"/>
-                <a:sym typeface="Raleway Semi-Bold"/>
-                <a:hlinkClick r:id="rId5" tooltip="https://doi.org/10.1016/j.ijresmar.2024.05.005"/>
-              </a:rPr>
-              <a:t>https://doi.org/10.1016/j.ijresmar.2024.05.005</a:t>
-            </a:r>
-            <a:r>
-              <a:rPr lang="en-US" sz="2058" b="true">
-                <a:solidFill>
-                  <a:srgbClr val="FFFFFF"/>
-                </a:solidFill>
-                <a:latin typeface="Raleway Semi-Bold"/>
-                <a:ea typeface="Raleway Semi-Bold"/>
-                <a:cs typeface="Raleway Semi-Bold"/>
-                <a:sym typeface="Raleway Semi-Bold"/>
-              </a:rPr>
-              <a:t> </a:t>
-            </a:r>
-          </a:p>
-          <a:p>
-            <a:pPr algn="ctr">
-              <a:lnSpc>
-                <a:spcPts val="2181"/>
-              </a:lnSpc>
-            </a:pPr>
-          </a:p>
-          <a:p>
-            <a:pPr algn="ctr">
-              <a:lnSpc>
-                <a:spcPts val="2181"/>
-              </a:lnSpc>
-            </a:pPr>
-            <a:r>
-              <a:rPr lang="en-US" sz="2058" b="true">
-                <a:solidFill>
-                  <a:srgbClr val="FFFFFF"/>
-                </a:solidFill>
-                <a:latin typeface="Raleway Semi-Bold"/>
-                <a:ea typeface="Raleway Semi-Bold"/>
-                <a:cs typeface="Raleway Semi-Bold"/>
-                <a:sym typeface="Raleway Semi-Bold"/>
-              </a:rPr>
-              <a:t>Wan, T. &amp; Chen Z. (2024). Exploring generative AI assisted feedback writing for students’ written responses to a physics conceptual question with prompt engineering and few-shot learning. </a:t>
-            </a:r>
-            <a:r>
-              <a:rPr lang="en-US" b="true" sz="2058" i="true">
-                <a:solidFill>
-                  <a:srgbClr val="FFFFFF"/>
-                </a:solidFill>
-                <a:latin typeface="Raleway Semi-Bold Italics"/>
-                <a:ea typeface="Raleway Semi-Bold Italics"/>
-                <a:cs typeface="Raleway Semi-Bold Italics"/>
-                <a:sym typeface="Raleway Semi-Bold Italics"/>
-              </a:rPr>
-              <a:t>Physical Review Physics Education Research</a:t>
-            </a:r>
-            <a:r>
-              <a:rPr lang="en-US" sz="2058" b="true">
-                <a:solidFill>
-                  <a:srgbClr val="FFFFFF"/>
-                </a:solidFill>
-                <a:latin typeface="Raleway Semi-Bold"/>
-                <a:ea typeface="Raleway Semi-Bold"/>
-                <a:cs typeface="Raleway Semi-Bold"/>
-                <a:sym typeface="Raleway Semi-Bold"/>
-              </a:rPr>
-              <a:t> 20(1). DOI: </a:t>
-            </a:r>
-            <a:r>
-              <a:rPr lang="en-US" b="true" sz="2058" u="sng">
-                <a:solidFill>
-                  <a:srgbClr val="FFFFFF"/>
-                </a:solidFill>
-                <a:latin typeface="Raleway Semi-Bold"/>
-                <a:ea typeface="Raleway Semi-Bold"/>
-                <a:cs typeface="Raleway Semi-Bold"/>
-                <a:sym typeface="Raleway Semi-Bold"/>
-                <a:hlinkClick r:id="rId6" tooltip="https://doi.org/10.1103/PhysRevPhysEducRes.20.010152"/>
-              </a:rPr>
-              <a:t>10.1103/PhysRevPhysEducRes.20.010152</a:t>
-            </a:r>
-            <a:r>
-              <a:rPr lang="en-US" sz="2058" b="true">
-                <a:solidFill>
-                  <a:srgbClr val="FFFFFF"/>
-                </a:solidFill>
-                <a:latin typeface="Raleway Semi-Bold"/>
-                <a:ea typeface="Raleway Semi-Bold"/>
-                <a:cs typeface="Raleway Semi-Bold"/>
-                <a:sym typeface="Raleway Semi-Bold"/>
-              </a:rPr>
-              <a:t> </a:t>
-            </a:r>
-          </a:p>
-          <a:p>
-            <a:pPr algn="ctr">
-              <a:lnSpc>
-                <a:spcPts val="2181"/>
-              </a:lnSpc>
-            </a:pPr>
-          </a:p>
-          <a:p>
-            <a:pPr algn="ctr">
-              <a:lnSpc>
-                <a:spcPts val="2181"/>
-              </a:lnSpc>
-              <a:spcBef>
-                <a:spcPct val="0"/>
-              </a:spcBef>
-            </a:pPr>
-          </a:p>
-        </p:txBody>
-      </p:sp>
-      <p:sp>
-        <p:nvSpPr>
-          <p:cNvPr name="TextBox 7" id="7"/>
-          <p:cNvSpPr txBox="true"/>
-          <p:nvPr/>
-        </p:nvSpPr>
-        <p:spPr>
-          <a:xfrm rot="0">
-            <a:off x="4769168" y="2495550"/>
-            <a:ext cx="8750142" cy="1169067"/>
-          </a:xfrm>
-          <a:prstGeom prst="rect">
-            <a:avLst/>
-          </a:prstGeom>
-        </p:spPr>
-        <p:txBody>
-          <a:bodyPr anchor="t" rtlCol="false" tIns="0" lIns="0" bIns="0" rIns="0">
-            <a:spAutoFit/>
-          </a:bodyPr>
-          <a:lstStyle/>
-          <a:p>
-            <a:pPr algn="ctr">
+            <a:pPr algn="l">
               <a:lnSpc>
                 <a:spcPts val="8936"/>
               </a:lnSpc>
@@ -4013,14 +3866,14 @@
                 <a:cs typeface="TT Lakes Neue Bold"/>
                 <a:sym typeface="TT Lakes Neue Bold"/>
               </a:rPr>
-              <a:t>REFERENCES</a:t>
-            </a:r>
-          </a:p>
-        </p:txBody>
-      </p:sp>
-      <p:sp>
-        <p:nvSpPr>
-          <p:cNvPr name="TextBox 8" id="8"/>
+              <a:t>NEXT STEPS</a:t>
+            </a:r>
+          </a:p>
+        </p:txBody>
+      </p:sp>
+      <p:sp>
+        <p:nvSpPr>
+          <p:cNvPr name="TextBox 10" id="10"/>
           <p:cNvSpPr txBox="true"/>
           <p:nvPr/>
         </p:nvSpPr>
@@ -4064,7 +3917,131 @@
       </p:sp>
       <p:sp>
         <p:nvSpPr>
-          <p:cNvPr name="TextBox 9" id="9"/>
+          <p:cNvPr name="TextBox 11" id="11"/>
+          <p:cNvSpPr txBox="true"/>
+          <p:nvPr/>
+        </p:nvSpPr>
+        <p:spPr>
+          <a:xfrm rot="0">
+            <a:off x="9449807" y="4381555"/>
+            <a:ext cx="7284546" cy="4410852"/>
+          </a:xfrm>
+          <a:prstGeom prst="rect">
+            <a:avLst/>
+          </a:prstGeom>
+        </p:spPr>
+        <p:txBody>
+          <a:bodyPr anchor="t" rtlCol="false" tIns="0" lIns="0" bIns="0" rIns="0">
+            <a:spAutoFit/>
+          </a:bodyPr>
+          <a:lstStyle/>
+          <a:p>
+            <a:pPr algn="l">
+              <a:lnSpc>
+                <a:spcPts val="3453"/>
+              </a:lnSpc>
+            </a:pPr>
+            <a:r>
+              <a:rPr lang="en-US" sz="3257" b="true">
+                <a:solidFill>
+                  <a:srgbClr val="FFFFFF"/>
+                </a:solidFill>
+                <a:latin typeface="Raleway Bold"/>
+                <a:ea typeface="Raleway Bold"/>
+                <a:cs typeface="Raleway Bold"/>
+                <a:sym typeface="Raleway Bold"/>
+              </a:rPr>
+              <a:t>Get access to HPC</a:t>
+            </a:r>
+          </a:p>
+          <a:p>
+            <a:pPr algn="l">
+              <a:lnSpc>
+                <a:spcPts val="3453"/>
+              </a:lnSpc>
+            </a:pPr>
+          </a:p>
+          <a:p>
+            <a:pPr algn="l">
+              <a:lnSpc>
+                <a:spcPts val="3453"/>
+              </a:lnSpc>
+            </a:pPr>
+            <a:r>
+              <a:rPr lang="en-US" sz="3257" b="true">
+                <a:solidFill>
+                  <a:srgbClr val="FFFFFF"/>
+                </a:solidFill>
+                <a:latin typeface="Raleway Bold"/>
+                <a:ea typeface="Raleway Bold"/>
+                <a:cs typeface="Raleway Bold"/>
+                <a:sym typeface="Raleway Bold"/>
+              </a:rPr>
+              <a:t>Adjust configuration plan, as necessary</a:t>
+            </a:r>
+          </a:p>
+          <a:p>
+            <a:pPr algn="l">
+              <a:lnSpc>
+                <a:spcPts val="3453"/>
+              </a:lnSpc>
+            </a:pPr>
+          </a:p>
+          <a:p>
+            <a:pPr algn="l">
+              <a:lnSpc>
+                <a:spcPts val="3453"/>
+              </a:lnSpc>
+            </a:pPr>
+            <a:r>
+              <a:rPr lang="en-US" sz="3257" b="true">
+                <a:solidFill>
+                  <a:srgbClr val="FFFFFF"/>
+                </a:solidFill>
+                <a:latin typeface="Raleway Bold"/>
+                <a:ea typeface="Raleway Bold"/>
+                <a:cs typeface="Raleway Bold"/>
+                <a:sym typeface="Raleway Bold"/>
+              </a:rPr>
+              <a:t>Program and Test</a:t>
+            </a:r>
+          </a:p>
+          <a:p>
+            <a:pPr algn="l">
+              <a:lnSpc>
+                <a:spcPts val="3453"/>
+              </a:lnSpc>
+            </a:pPr>
+          </a:p>
+          <a:p>
+            <a:pPr algn="l">
+              <a:lnSpc>
+                <a:spcPts val="3453"/>
+              </a:lnSpc>
+            </a:pPr>
+          </a:p>
+          <a:p>
+            <a:pPr algn="l">
+              <a:lnSpc>
+                <a:spcPts val="3453"/>
+              </a:lnSpc>
+            </a:pPr>
+          </a:p>
+          <a:p>
+            <a:pPr algn="l">
+              <a:lnSpc>
+                <a:spcPts val="3453"/>
+              </a:lnSpc>
+              <a:spcBef>
+                <a:spcPct val="0"/>
+              </a:spcBef>
+            </a:pPr>
+          </a:p>
+        </p:txBody>
+      </p:sp>
+      <p:sp>
+        <p:nvSpPr>
+          <p:cNvPr name="TextBox 12" id="12"/>
           <p:cNvSpPr txBox="true"/>
           <p:nvPr/>
         </p:nvSpPr>
@@ -4134,6 +4111,1075 @@
 </file>
 
 <file path=ppt/slides/slide11.xml><?xml version="1.0" encoding="utf-8"?>
+<p:sld xmlns:p="http://schemas.openxmlformats.org/presentationml/2006/main" xmlns:a="http://schemas.openxmlformats.org/drawingml/2006/main" xmlns:r="http://schemas.openxmlformats.org/officeDocument/2006/relationships">
+  <p:cSld>
+    <p:bg>
+      <p:bgPr>
+        <a:gradFill rotWithShape="true">
+          <a:gsLst>
+            <a:gs pos="0">
+              <a:srgbClr val="131F40">
+                <a:alpha val="100000"/>
+              </a:srgbClr>
+            </a:gs>
+            <a:gs pos="100000">
+              <a:srgbClr val="3D6D81">
+                <a:alpha val="100000"/>
+              </a:srgbClr>
+            </a:gs>
+          </a:gsLst>
+          <a:lin ang="5400000"/>
+        </a:gradFill>
+      </p:bgPr>
+    </p:bg>
+    <p:spTree>
+      <p:nvGrpSpPr>
+        <p:cNvPr id="1" name=""/>
+        <p:cNvGrpSpPr/>
+        <p:nvPr/>
+      </p:nvGrpSpPr>
+      <p:grpSpPr>
+        <a:xfrm>
+          <a:off x="0" y="0"/>
+          <a:ext cx="0" cy="0"/>
+          <a:chOff x="0" y="0"/>
+          <a:chExt cx="0" cy="0"/>
+        </a:xfrm>
+      </p:grpSpPr>
+      <p:sp>
+        <p:nvSpPr>
+          <p:cNvPr name="Freeform 2" id="2"/>
+          <p:cNvSpPr/>
+          <p:nvPr/>
+        </p:nvSpPr>
+        <p:spPr>
+          <a:xfrm flipH="false" flipV="false" rot="0">
+            <a:off x="1711939" y="1306549"/>
+            <a:ext cx="742265" cy="742265"/>
+          </a:xfrm>
+          <a:custGeom>
+            <a:avLst/>
+            <a:gdLst/>
+            <a:ahLst/>
+            <a:cxnLst/>
+            <a:rect r="r" b="b" t="t" l="l"/>
+            <a:pathLst>
+              <a:path h="742265" w="742265">
+                <a:moveTo>
+                  <a:pt x="0" y="0"/>
+                </a:moveTo>
+                <a:lnTo>
+                  <a:pt x="742264" y="0"/>
+                </a:lnTo>
+                <a:lnTo>
+                  <a:pt x="742264" y="742265"/>
+                </a:lnTo>
+                <a:lnTo>
+                  <a:pt x="0" y="742265"/>
+                </a:lnTo>
+                <a:lnTo>
+                  <a:pt x="0" y="0"/>
+                </a:lnTo>
+                <a:close/>
+              </a:path>
+            </a:pathLst>
+          </a:custGeom>
+          <a:blipFill>
+            <a:blip r:embed="rId2">
+              <a:extLst>
+                <a:ext uri="{96DAC541-7B7A-43D3-8B79-37D633B846F1}">
+                  <asvg:svgBlip xmlns:asvg="http://schemas.microsoft.com/office/drawing/2016/SVG/main" r:embed="rId3"/>
+                </a:ext>
+              </a:extLst>
+            </a:blip>
+            <a:stretch>
+              <a:fillRect l="0" t="0" r="0" b="0"/>
+            </a:stretch>
+          </a:blipFill>
+        </p:spPr>
+      </p:sp>
+      <p:grpSp>
+        <p:nvGrpSpPr>
+          <p:cNvPr name="Group 3" id="3"/>
+          <p:cNvGrpSpPr/>
+          <p:nvPr/>
+        </p:nvGrpSpPr>
+        <p:grpSpPr>
+          <a:xfrm rot="0">
+            <a:off x="-152807" y="3505117"/>
+            <a:ext cx="18688947" cy="5072465"/>
+            <a:chOff x="0" y="0"/>
+            <a:chExt cx="4922192" cy="1335958"/>
+          </a:xfrm>
+        </p:grpSpPr>
+        <p:sp>
+          <p:nvSpPr>
+            <p:cNvPr name="Freeform 4" id="4"/>
+            <p:cNvSpPr/>
+            <p:nvPr/>
+          </p:nvSpPr>
+          <p:spPr>
+            <a:xfrm flipH="false" flipV="false" rot="0">
+              <a:off x="0" y="0"/>
+              <a:ext cx="4922192" cy="1335958"/>
+            </a:xfrm>
+            <a:custGeom>
+              <a:avLst/>
+              <a:gdLst/>
+              <a:ahLst/>
+              <a:cxnLst/>
+              <a:rect r="r" b="b" t="t" l="l"/>
+              <a:pathLst>
+                <a:path h="1335958" w="4922192">
+                  <a:moveTo>
+                    <a:pt x="0" y="0"/>
+                  </a:moveTo>
+                  <a:lnTo>
+                    <a:pt x="4922192" y="0"/>
+                  </a:lnTo>
+                  <a:lnTo>
+                    <a:pt x="4922192" y="1335958"/>
+                  </a:lnTo>
+                  <a:lnTo>
+                    <a:pt x="0" y="1335958"/>
+                  </a:lnTo>
+                  <a:close/>
+                </a:path>
+              </a:pathLst>
+            </a:custGeom>
+            <a:gradFill rotWithShape="true">
+              <a:gsLst>
+                <a:gs pos="0">
+                  <a:srgbClr val="131F40">
+                    <a:alpha val="75000"/>
+                  </a:srgbClr>
+                </a:gs>
+                <a:gs pos="100000">
+                  <a:srgbClr val="3D6D81">
+                    <a:alpha val="75000"/>
+                  </a:srgbClr>
+                </a:gs>
+              </a:gsLst>
+              <a:lin ang="0"/>
+            </a:gradFill>
+          </p:spPr>
+        </p:sp>
+        <p:sp>
+          <p:nvSpPr>
+            <p:cNvPr name="TextBox 5" id="5"/>
+            <p:cNvSpPr txBox="true"/>
+            <p:nvPr/>
+          </p:nvSpPr>
+          <p:spPr>
+            <a:xfrm>
+              <a:off x="0" y="28575"/>
+              <a:ext cx="4922192" cy="1307383"/>
+            </a:xfrm>
+            <a:prstGeom prst="rect">
+              <a:avLst/>
+            </a:prstGeom>
+          </p:spPr>
+          <p:txBody>
+            <a:bodyPr anchor="ctr" rtlCol="false" tIns="50800" lIns="50800" bIns="50800" rIns="50800"/>
+            <a:lstStyle/>
+            <a:p>
+              <a:pPr algn="ctr">
+                <a:lnSpc>
+                  <a:spcPts val="2181"/>
+                </a:lnSpc>
+              </a:pPr>
+            </a:p>
+          </p:txBody>
+        </p:sp>
+      </p:grpSp>
+      <p:sp>
+        <p:nvSpPr>
+          <p:cNvPr name="TextBox 6" id="6"/>
+          <p:cNvSpPr txBox="true"/>
+          <p:nvPr/>
+        </p:nvSpPr>
+        <p:spPr>
+          <a:xfrm rot="0">
+            <a:off x="4111353" y="3864215"/>
+            <a:ext cx="11556954" cy="4713366"/>
+          </a:xfrm>
+          <a:prstGeom prst="rect">
+            <a:avLst/>
+          </a:prstGeom>
+        </p:spPr>
+        <p:txBody>
+          <a:bodyPr anchor="t" rtlCol="false" tIns="0" lIns="0" bIns="0" rIns="0">
+            <a:spAutoFit/>
+          </a:bodyPr>
+          <a:lstStyle/>
+          <a:p>
+            <a:pPr algn="ctr">
+              <a:lnSpc>
+                <a:spcPts val="2181"/>
+              </a:lnSpc>
+            </a:pPr>
+            <a:r>
+              <a:rPr lang="en-US" sz="2058" b="true">
+                <a:solidFill>
+                  <a:srgbClr val="FFFFFF"/>
+                </a:solidFill>
+                <a:latin typeface="Raleway Semi-Bold"/>
+                <a:ea typeface="Raleway Semi-Bold"/>
+                <a:cs typeface="Raleway Semi-Bold"/>
+                <a:sym typeface="Raleway Semi-Bold"/>
+              </a:rPr>
+              <a:t>Jho, H. &amp; Ha, M. (2024) Towards effective argumentation: Design and implementation of a generative AI-based evaluation and feedback. </a:t>
+            </a:r>
+            <a:r>
+              <a:rPr lang="en-US" b="true" sz="2058" i="true">
+                <a:solidFill>
+                  <a:srgbClr val="FFFFFF"/>
+                </a:solidFill>
+                <a:latin typeface="Raleway Semi-Bold Italics"/>
+                <a:ea typeface="Raleway Semi-Bold Italics"/>
+                <a:cs typeface="Raleway Semi-Bold Italics"/>
+                <a:sym typeface="Raleway Semi-Bold Italics"/>
+              </a:rPr>
+              <a:t>Journal of Baltic Science Education, 23</a:t>
+            </a:r>
+            <a:r>
+              <a:rPr lang="en-US" sz="2058" b="true">
+                <a:solidFill>
+                  <a:srgbClr val="FFFFFF"/>
+                </a:solidFill>
+                <a:latin typeface="Raleway Semi-Bold"/>
+                <a:ea typeface="Raleway Semi-Bold"/>
+                <a:cs typeface="Raleway Semi-Bold"/>
+                <a:sym typeface="Raleway Semi-Bold"/>
+              </a:rPr>
+              <a:t>(2), 280-291. </a:t>
+            </a:r>
+            <a:r>
+              <a:rPr lang="en-US" b="true" sz="2058" u="sng">
+                <a:solidFill>
+                  <a:srgbClr val="FFFFFF"/>
+                </a:solidFill>
+                <a:latin typeface="Raleway Semi-Bold"/>
+                <a:ea typeface="Raleway Semi-Bold"/>
+                <a:cs typeface="Raleway Semi-Bold"/>
+                <a:sym typeface="Raleway Semi-Bold"/>
+                <a:hlinkClick r:id="rId4" tooltip="https://doi.org/10.33225/jbse/24.23.280"/>
+              </a:rPr>
+              <a:t>https://doi.org/10.33225/jbse/24.23.280</a:t>
+            </a:r>
+            <a:r>
+              <a:rPr lang="en-US" sz="2058" b="true">
+                <a:solidFill>
+                  <a:srgbClr val="FFFFFF"/>
+                </a:solidFill>
+                <a:latin typeface="Raleway Semi-Bold"/>
+                <a:ea typeface="Raleway Semi-Bold"/>
+                <a:cs typeface="Raleway Semi-Bold"/>
+                <a:sym typeface="Raleway Semi-Bold"/>
+              </a:rPr>
+              <a:t> </a:t>
+            </a:r>
+          </a:p>
+          <a:p>
+            <a:pPr algn="ctr">
+              <a:lnSpc>
+                <a:spcPts val="2181"/>
+              </a:lnSpc>
+            </a:pPr>
+          </a:p>
+          <a:p>
+            <a:pPr algn="ctr">
+              <a:lnSpc>
+                <a:spcPts val="2181"/>
+              </a:lnSpc>
+            </a:pPr>
+            <a:r>
+              <a:rPr lang="en-US" sz="2058" b="true">
+                <a:solidFill>
+                  <a:srgbClr val="FFFFFF"/>
+                </a:solidFill>
+                <a:latin typeface="Raleway Semi-Bold"/>
+                <a:ea typeface="Raleway Semi-Bold"/>
+                <a:cs typeface="Raleway Semi-Bold"/>
+                <a:sym typeface="Raleway Semi-Bold"/>
+              </a:rPr>
+              <a:t>Jurgensmeier, L. &amp; Skiera, B. (2024). Generative AI for scalable feedback to multimodal exercises. </a:t>
+            </a:r>
+            <a:r>
+              <a:rPr lang="en-US" b="true" sz="2058" i="true">
+                <a:solidFill>
+                  <a:srgbClr val="FFFFFF"/>
+                </a:solidFill>
+                <a:latin typeface="Raleway Semi-Bold Italics"/>
+                <a:ea typeface="Raleway Semi-Bold Italics"/>
+                <a:cs typeface="Raleway Semi-Bold Italics"/>
+                <a:sym typeface="Raleway Semi-Bold Italics"/>
+              </a:rPr>
+              <a:t>International Journal of Research in Marketing</a:t>
+            </a:r>
+            <a:r>
+              <a:rPr lang="en-US" sz="2058" b="true">
+                <a:solidFill>
+                  <a:srgbClr val="FFFFFF"/>
+                </a:solidFill>
+                <a:latin typeface="Raleway Semi-Bold"/>
+                <a:ea typeface="Raleway Semi-Bold"/>
+                <a:cs typeface="Raleway Semi-Bold"/>
+                <a:sym typeface="Raleway Semi-Bold"/>
+              </a:rPr>
+              <a:t>. 41, 468-488. </a:t>
+            </a:r>
+            <a:r>
+              <a:rPr lang="en-US" b="true" sz="2058" u="sng">
+                <a:solidFill>
+                  <a:srgbClr val="FFFFFF"/>
+                </a:solidFill>
+                <a:latin typeface="Raleway Semi-Bold"/>
+                <a:ea typeface="Raleway Semi-Bold"/>
+                <a:cs typeface="Raleway Semi-Bold"/>
+                <a:sym typeface="Raleway Semi-Bold"/>
+                <a:hlinkClick r:id="rId5" tooltip="https://doi.org/10.1016/j.ijresmar.2024.05.005"/>
+              </a:rPr>
+              <a:t>https://doi.org/10.1016/j.ijresmar.2024.05.005</a:t>
+            </a:r>
+            <a:r>
+              <a:rPr lang="en-US" sz="2058" b="true">
+                <a:solidFill>
+                  <a:srgbClr val="FFFFFF"/>
+                </a:solidFill>
+                <a:latin typeface="Raleway Semi-Bold"/>
+                <a:ea typeface="Raleway Semi-Bold"/>
+                <a:cs typeface="Raleway Semi-Bold"/>
+                <a:sym typeface="Raleway Semi-Bold"/>
+              </a:rPr>
+              <a:t> </a:t>
+            </a:r>
+          </a:p>
+          <a:p>
+            <a:pPr algn="ctr">
+              <a:lnSpc>
+                <a:spcPts val="2181"/>
+              </a:lnSpc>
+            </a:pPr>
+          </a:p>
+          <a:p>
+            <a:pPr algn="ctr">
+              <a:lnSpc>
+                <a:spcPts val="2181"/>
+              </a:lnSpc>
+            </a:pPr>
+            <a:r>
+              <a:rPr lang="en-US" sz="2058" b="true">
+                <a:solidFill>
+                  <a:srgbClr val="FFFFFF"/>
+                </a:solidFill>
+                <a:latin typeface="Raleway Semi-Bold"/>
+                <a:ea typeface="Raleway Semi-Bold"/>
+                <a:cs typeface="Raleway Semi-Bold"/>
+                <a:sym typeface="Raleway Semi-Bold"/>
+              </a:rPr>
+              <a:t>Khan, S. (2024) </a:t>
+            </a:r>
+            <a:r>
+              <a:rPr lang="en-US" b="true" sz="2058" i="true">
+                <a:solidFill>
+                  <a:srgbClr val="FFFFFF"/>
+                </a:solidFill>
+                <a:latin typeface="Raleway Semi-Bold Italics"/>
+                <a:ea typeface="Raleway Semi-Bold Italics"/>
+                <a:cs typeface="Raleway Semi-Bold Italics"/>
+                <a:sym typeface="Raleway Semi-Bold Italics"/>
+              </a:rPr>
+              <a:t>Brave New Words: How AI Will Revolutionize Education (and Why That’s a Good Thing).</a:t>
+            </a:r>
+            <a:r>
+              <a:rPr lang="en-US" sz="2058" b="true">
+                <a:solidFill>
+                  <a:srgbClr val="FFFFFF"/>
+                </a:solidFill>
+                <a:latin typeface="Raleway Semi-Bold"/>
+                <a:ea typeface="Raleway Semi-Bold"/>
+                <a:cs typeface="Raleway Semi-Bold"/>
+                <a:sym typeface="Raleway Semi-Bold"/>
+              </a:rPr>
+              <a:t> Viking.</a:t>
+            </a:r>
+          </a:p>
+          <a:p>
+            <a:pPr algn="ctr">
+              <a:lnSpc>
+                <a:spcPts val="2181"/>
+              </a:lnSpc>
+            </a:pPr>
+          </a:p>
+          <a:p>
+            <a:pPr algn="ctr">
+              <a:lnSpc>
+                <a:spcPts val="2181"/>
+              </a:lnSpc>
+            </a:pPr>
+            <a:r>
+              <a:rPr lang="en-US" sz="2058" b="true">
+                <a:solidFill>
+                  <a:srgbClr val="FFFFFF"/>
+                </a:solidFill>
+                <a:latin typeface="Raleway Semi-Bold"/>
+                <a:ea typeface="Raleway Semi-Bold"/>
+                <a:cs typeface="Raleway Semi-Bold"/>
+                <a:sym typeface="Raleway Semi-Bold"/>
+              </a:rPr>
+              <a:t>Wan, T. &amp; Chen Z. (2024). Exploring generative AI assisted feedback writing for students’ written responses to a physics conceptual question with prompt engineering and few-shot learning. </a:t>
+            </a:r>
+            <a:r>
+              <a:rPr lang="en-US" b="true" sz="2058" i="true">
+                <a:solidFill>
+                  <a:srgbClr val="FFFFFF"/>
+                </a:solidFill>
+                <a:latin typeface="Raleway Semi-Bold Italics"/>
+                <a:ea typeface="Raleway Semi-Bold Italics"/>
+                <a:cs typeface="Raleway Semi-Bold Italics"/>
+                <a:sym typeface="Raleway Semi-Bold Italics"/>
+              </a:rPr>
+              <a:t>Physical Review Physics Education Research</a:t>
+            </a:r>
+            <a:r>
+              <a:rPr lang="en-US" sz="2058" b="true">
+                <a:solidFill>
+                  <a:srgbClr val="FFFFFF"/>
+                </a:solidFill>
+                <a:latin typeface="Raleway Semi-Bold"/>
+                <a:ea typeface="Raleway Semi-Bold"/>
+                <a:cs typeface="Raleway Semi-Bold"/>
+                <a:sym typeface="Raleway Semi-Bold"/>
+              </a:rPr>
+              <a:t> 20(1). DOI: </a:t>
+            </a:r>
+            <a:r>
+              <a:rPr lang="en-US" b="true" sz="2058" u="sng">
+                <a:solidFill>
+                  <a:srgbClr val="FFFFFF"/>
+                </a:solidFill>
+                <a:latin typeface="Raleway Semi-Bold"/>
+                <a:ea typeface="Raleway Semi-Bold"/>
+                <a:cs typeface="Raleway Semi-Bold"/>
+                <a:sym typeface="Raleway Semi-Bold"/>
+                <a:hlinkClick r:id="rId6" tooltip="https://doi.org/10.1103/PhysRevPhysEducRes.20.010152"/>
+              </a:rPr>
+              <a:t>10.1103/PhysRevPhysEducRes.20.010152</a:t>
+            </a:r>
+            <a:r>
+              <a:rPr lang="en-US" sz="2058" b="true">
+                <a:solidFill>
+                  <a:srgbClr val="FFFFFF"/>
+                </a:solidFill>
+                <a:latin typeface="Raleway Semi-Bold"/>
+                <a:ea typeface="Raleway Semi-Bold"/>
+                <a:cs typeface="Raleway Semi-Bold"/>
+                <a:sym typeface="Raleway Semi-Bold"/>
+              </a:rPr>
+              <a:t> </a:t>
+            </a:r>
+          </a:p>
+          <a:p>
+            <a:pPr algn="ctr">
+              <a:lnSpc>
+                <a:spcPts val="2181"/>
+              </a:lnSpc>
+            </a:pPr>
+          </a:p>
+          <a:p>
+            <a:pPr algn="ctr">
+              <a:lnSpc>
+                <a:spcPts val="2181"/>
+              </a:lnSpc>
+              <a:spcBef>
+                <a:spcPct val="0"/>
+              </a:spcBef>
+            </a:pPr>
+          </a:p>
+        </p:txBody>
+      </p:sp>
+      <p:sp>
+        <p:nvSpPr>
+          <p:cNvPr name="TextBox 7" id="7"/>
+          <p:cNvSpPr txBox="true"/>
+          <p:nvPr/>
+        </p:nvSpPr>
+        <p:spPr>
+          <a:xfrm rot="0">
+            <a:off x="4769168" y="2495550"/>
+            <a:ext cx="8750142" cy="1169067"/>
+          </a:xfrm>
+          <a:prstGeom prst="rect">
+            <a:avLst/>
+          </a:prstGeom>
+        </p:spPr>
+        <p:txBody>
+          <a:bodyPr anchor="t" rtlCol="false" tIns="0" lIns="0" bIns="0" rIns="0">
+            <a:spAutoFit/>
+          </a:bodyPr>
+          <a:lstStyle/>
+          <a:p>
+            <a:pPr algn="ctr">
+              <a:lnSpc>
+                <a:spcPts val="8936"/>
+              </a:lnSpc>
+              <a:spcBef>
+                <a:spcPct val="0"/>
+              </a:spcBef>
+            </a:pPr>
+            <a:r>
+              <a:rPr lang="en-US" b="true" sz="8430">
+                <a:solidFill>
+                  <a:srgbClr val="84E3F8"/>
+                </a:solidFill>
+                <a:latin typeface="TT Lakes Neue Bold"/>
+                <a:ea typeface="TT Lakes Neue Bold"/>
+                <a:cs typeface="TT Lakes Neue Bold"/>
+                <a:sym typeface="TT Lakes Neue Bold"/>
+              </a:rPr>
+              <a:t>REFERENCES</a:t>
+            </a:r>
+          </a:p>
+        </p:txBody>
+      </p:sp>
+      <p:sp>
+        <p:nvSpPr>
+          <p:cNvPr name="TextBox 8" id="8"/>
+          <p:cNvSpPr txBox="true"/>
+          <p:nvPr/>
+        </p:nvSpPr>
+        <p:spPr>
+          <a:xfrm rot="0">
+            <a:off x="16175678" y="1560323"/>
+            <a:ext cx="1418817" cy="263273"/>
+          </a:xfrm>
+          <a:prstGeom prst="rect">
+            <a:avLst/>
+          </a:prstGeom>
+        </p:spPr>
+        <p:txBody>
+          <a:bodyPr anchor="t" rtlCol="false" tIns="0" lIns="0" bIns="0" rIns="0">
+            <a:spAutoFit/>
+          </a:bodyPr>
+          <a:lstStyle/>
+          <a:p>
+            <a:pPr algn="l">
+              <a:lnSpc>
+                <a:spcPts val="2067"/>
+              </a:lnSpc>
+              <a:spcBef>
+                <a:spcPct val="0"/>
+              </a:spcBef>
+            </a:pPr>
+            <a:r>
+              <a:rPr lang="en-US" sz="1950">
+                <a:solidFill>
+                  <a:srgbClr val="FFFFFF"/>
+                </a:solidFill>
+                <a:latin typeface="TT Lakes Neue"/>
+                <a:ea typeface="TT Lakes Neue"/>
+                <a:cs typeface="TT Lakes Neue"/>
+                <a:sym typeface="TT Lakes Neue"/>
+              </a:rPr>
+              <a:t>PAGE 11</a:t>
+            </a:r>
+          </a:p>
+        </p:txBody>
+      </p:sp>
+      <p:sp>
+        <p:nvSpPr>
+          <p:cNvPr name="TextBox 9" id="9"/>
+          <p:cNvSpPr txBox="true"/>
+          <p:nvPr/>
+        </p:nvSpPr>
+        <p:spPr>
+          <a:xfrm rot="0">
+            <a:off x="2692536" y="1431726"/>
+            <a:ext cx="3943940" cy="520448"/>
+          </a:xfrm>
+          <a:prstGeom prst="rect">
+            <a:avLst/>
+          </a:prstGeom>
+        </p:spPr>
+        <p:txBody>
+          <a:bodyPr anchor="t" rtlCol="false" tIns="0" lIns="0" bIns="0" rIns="0">
+            <a:spAutoFit/>
+          </a:bodyPr>
+          <a:lstStyle/>
+          <a:p>
+            <a:pPr algn="l">
+              <a:lnSpc>
+                <a:spcPts val="2067"/>
+              </a:lnSpc>
+            </a:pPr>
+            <a:r>
+              <a:rPr lang="en-US" sz="1950">
+                <a:solidFill>
+                  <a:srgbClr val="FFFFFF"/>
+                </a:solidFill>
+                <a:latin typeface="TT Lakes Neue"/>
+                <a:ea typeface="TT Lakes Neue"/>
+                <a:cs typeface="TT Lakes Neue"/>
+                <a:sym typeface="TT Lakes Neue"/>
+              </a:rPr>
+              <a:t>LEHIGH UNIVERSITY</a:t>
+            </a:r>
+          </a:p>
+          <a:p>
+            <a:pPr algn="l">
+              <a:lnSpc>
+                <a:spcPts val="2067"/>
+              </a:lnSpc>
+              <a:spcBef>
+                <a:spcPct val="0"/>
+              </a:spcBef>
+            </a:pPr>
+            <a:r>
+              <a:rPr lang="en-US" sz="1950">
+                <a:solidFill>
+                  <a:srgbClr val="FFFFFF"/>
+                </a:solidFill>
+                <a:latin typeface="TT Lakes Neue"/>
+                <a:ea typeface="TT Lakes Neue"/>
+                <a:cs typeface="TT Lakes Neue"/>
+                <a:sym typeface="TT Lakes Neue"/>
+              </a:rPr>
+              <a:t>DATA SCIENCE</a:t>
+            </a:r>
+          </a:p>
+        </p:txBody>
+      </p:sp>
+    </p:spTree>
+  </p:cSld>
+  <p:clrMapOvr>
+    <a:masterClrMapping/>
+  </p:clrMapOvr>
+</p:sld>
+</file>
+
+<file path=ppt/slides/slide12.xml><?xml version="1.0" encoding="utf-8"?>
+<p:sld xmlns:p="http://schemas.openxmlformats.org/presentationml/2006/main" xmlns:a="http://schemas.openxmlformats.org/drawingml/2006/main" xmlns:r="http://schemas.openxmlformats.org/officeDocument/2006/relationships">
+  <p:cSld>
+    <p:bg>
+      <p:bgPr>
+        <a:gradFill rotWithShape="true">
+          <a:gsLst>
+            <a:gs pos="0">
+              <a:srgbClr val="131F40">
+                <a:alpha val="100000"/>
+              </a:srgbClr>
+            </a:gs>
+            <a:gs pos="100000">
+              <a:srgbClr val="3D6D81">
+                <a:alpha val="100000"/>
+              </a:srgbClr>
+            </a:gs>
+          </a:gsLst>
+          <a:lin ang="5400000"/>
+        </a:gradFill>
+      </p:bgPr>
+    </p:bg>
+    <p:spTree>
+      <p:nvGrpSpPr>
+        <p:cNvPr id="1" name=""/>
+        <p:cNvGrpSpPr/>
+        <p:nvPr/>
+      </p:nvGrpSpPr>
+      <p:grpSpPr>
+        <a:xfrm>
+          <a:off x="0" y="0"/>
+          <a:ext cx="0" cy="0"/>
+          <a:chOff x="0" y="0"/>
+          <a:chExt cx="0" cy="0"/>
+        </a:xfrm>
+      </p:grpSpPr>
+      <p:sp>
+        <p:nvSpPr>
+          <p:cNvPr name="Freeform 2" id="2"/>
+          <p:cNvSpPr/>
+          <p:nvPr/>
+        </p:nvSpPr>
+        <p:spPr>
+          <a:xfrm flipH="false" flipV="false" rot="-5400000">
+            <a:off x="4984803" y="-1314334"/>
+            <a:ext cx="8318394" cy="13299759"/>
+          </a:xfrm>
+          <a:custGeom>
+            <a:avLst/>
+            <a:gdLst/>
+            <a:ahLst/>
+            <a:cxnLst/>
+            <a:rect r="r" b="b" t="t" l="l"/>
+            <a:pathLst>
+              <a:path h="13299759" w="8318394">
+                <a:moveTo>
+                  <a:pt x="0" y="0"/>
+                </a:moveTo>
+                <a:lnTo>
+                  <a:pt x="8318394" y="0"/>
+                </a:lnTo>
+                <a:lnTo>
+                  <a:pt x="8318394" y="13299759"/>
+                </a:lnTo>
+                <a:lnTo>
+                  <a:pt x="0" y="13299759"/>
+                </a:lnTo>
+                <a:lnTo>
+                  <a:pt x="0" y="0"/>
+                </a:lnTo>
+                <a:close/>
+              </a:path>
+            </a:pathLst>
+          </a:custGeom>
+          <a:blipFill>
+            <a:blip r:embed="rId2">
+              <a:extLst>
+                <a:ext uri="{96DAC541-7B7A-43D3-8B79-37D633B846F1}">
+                  <asvg:svgBlip xmlns:asvg="http://schemas.microsoft.com/office/drawing/2016/SVG/main" r:embed="rId3"/>
+                </a:ext>
+              </a:extLst>
+            </a:blip>
+            <a:stretch>
+              <a:fillRect l="0" t="0" r="0" b="0"/>
+            </a:stretch>
+          </a:blipFill>
+        </p:spPr>
+      </p:sp>
+      <p:sp>
+        <p:nvSpPr>
+          <p:cNvPr name="Freeform 3" id="3"/>
+          <p:cNvSpPr/>
+          <p:nvPr/>
+        </p:nvSpPr>
+        <p:spPr>
+          <a:xfrm flipH="false" flipV="false" rot="0">
+            <a:off x="8055515" y="2243991"/>
+            <a:ext cx="742265" cy="742265"/>
+          </a:xfrm>
+          <a:custGeom>
+            <a:avLst/>
+            <a:gdLst/>
+            <a:ahLst/>
+            <a:cxnLst/>
+            <a:rect r="r" b="b" t="t" l="l"/>
+            <a:pathLst>
+              <a:path h="742265" w="742265">
+                <a:moveTo>
+                  <a:pt x="0" y="0"/>
+                </a:moveTo>
+                <a:lnTo>
+                  <a:pt x="742264" y="0"/>
+                </a:lnTo>
+                <a:lnTo>
+                  <a:pt x="742264" y="742265"/>
+                </a:lnTo>
+                <a:lnTo>
+                  <a:pt x="0" y="742265"/>
+                </a:lnTo>
+                <a:lnTo>
+                  <a:pt x="0" y="0"/>
+                </a:lnTo>
+                <a:close/>
+              </a:path>
+            </a:pathLst>
+          </a:custGeom>
+          <a:blipFill>
+            <a:blip r:embed="rId4">
+              <a:extLst>
+                <a:ext uri="{96DAC541-7B7A-43D3-8B79-37D633B846F1}">
+                  <asvg:svgBlip xmlns:asvg="http://schemas.microsoft.com/office/drawing/2016/SVG/main" r:embed="rId5"/>
+                </a:ext>
+              </a:extLst>
+            </a:blip>
+            <a:stretch>
+              <a:fillRect l="0" t="0" r="0" b="0"/>
+            </a:stretch>
+          </a:blipFill>
+        </p:spPr>
+      </p:sp>
+      <p:sp>
+        <p:nvSpPr>
+          <p:cNvPr name="TextBox 4" id="4"/>
+          <p:cNvSpPr txBox="true"/>
+          <p:nvPr/>
+        </p:nvSpPr>
+        <p:spPr>
+          <a:xfrm rot="0">
+            <a:off x="9036112" y="2369168"/>
+            <a:ext cx="1418817" cy="520485"/>
+          </a:xfrm>
+          <a:prstGeom prst="rect">
+            <a:avLst/>
+          </a:prstGeom>
+        </p:spPr>
+        <p:txBody>
+          <a:bodyPr anchor="t" rtlCol="false" tIns="0" lIns="0" bIns="0" rIns="0">
+            <a:spAutoFit/>
+          </a:bodyPr>
+          <a:lstStyle/>
+          <a:p>
+            <a:pPr algn="l">
+              <a:lnSpc>
+                <a:spcPts val="2067"/>
+              </a:lnSpc>
+              <a:spcBef>
+                <a:spcPct val="0"/>
+              </a:spcBef>
+            </a:pPr>
+            <a:r>
+              <a:rPr lang="en-US" sz="1950">
+                <a:solidFill>
+                  <a:srgbClr val="FFFFFF"/>
+                </a:solidFill>
+                <a:latin typeface="TT Lakes Neue"/>
+                <a:ea typeface="TT Lakes Neue"/>
+                <a:cs typeface="TT Lakes Neue"/>
+                <a:sym typeface="TT Lakes Neue"/>
+              </a:rPr>
+              <a:t>STUDIO SHODWE</a:t>
+            </a:r>
+          </a:p>
+        </p:txBody>
+      </p:sp>
+      <p:sp>
+        <p:nvSpPr>
+          <p:cNvPr name="TextBox 5" id="5"/>
+          <p:cNvSpPr txBox="true"/>
+          <p:nvPr/>
+        </p:nvSpPr>
+        <p:spPr>
+          <a:xfrm rot="0">
+            <a:off x="16175678" y="1560323"/>
+            <a:ext cx="1418817" cy="263292"/>
+          </a:xfrm>
+          <a:prstGeom prst="rect">
+            <a:avLst/>
+          </a:prstGeom>
+        </p:spPr>
+        <p:txBody>
+          <a:bodyPr anchor="t" rtlCol="false" tIns="0" lIns="0" bIns="0" rIns="0">
+            <a:spAutoFit/>
+          </a:bodyPr>
+          <a:lstStyle/>
+          <a:p>
+            <a:pPr algn="l">
+              <a:lnSpc>
+                <a:spcPts val="2067"/>
+              </a:lnSpc>
+              <a:spcBef>
+                <a:spcPct val="0"/>
+              </a:spcBef>
+            </a:pPr>
+            <a:r>
+              <a:rPr lang="en-US" sz="1950">
+                <a:solidFill>
+                  <a:srgbClr val="FFFFFF"/>
+                </a:solidFill>
+                <a:latin typeface="TT Lakes Neue"/>
+                <a:ea typeface="TT Lakes Neue"/>
+                <a:cs typeface="TT Lakes Neue"/>
+                <a:sym typeface="TT Lakes Neue"/>
+              </a:rPr>
+              <a:t>PAGE 12</a:t>
+            </a:r>
+          </a:p>
+        </p:txBody>
+      </p:sp>
+      <p:sp>
+        <p:nvSpPr>
+          <p:cNvPr name="TextBox 6" id="6"/>
+          <p:cNvSpPr txBox="true"/>
+          <p:nvPr/>
+        </p:nvSpPr>
+        <p:spPr>
+          <a:xfrm rot="0">
+            <a:off x="6595089" y="4598153"/>
+            <a:ext cx="5097823" cy="1636709"/>
+          </a:xfrm>
+          <a:prstGeom prst="rect">
+            <a:avLst/>
+          </a:prstGeom>
+        </p:spPr>
+        <p:txBody>
+          <a:bodyPr anchor="t" rtlCol="false" tIns="0" lIns="0" bIns="0" rIns="0">
+            <a:spAutoFit/>
+          </a:bodyPr>
+          <a:lstStyle/>
+          <a:p>
+            <a:pPr algn="ctr">
+              <a:lnSpc>
+                <a:spcPts val="12523"/>
+              </a:lnSpc>
+              <a:spcBef>
+                <a:spcPct val="0"/>
+              </a:spcBef>
+            </a:pPr>
+            <a:r>
+              <a:rPr lang="en-US" b="true" sz="11814">
+                <a:solidFill>
+                  <a:srgbClr val="FFFFFF"/>
+                </a:solidFill>
+                <a:latin typeface="TT Lakes Neue Bold"/>
+                <a:ea typeface="TT Lakes Neue Bold"/>
+                <a:cs typeface="TT Lakes Neue Bold"/>
+                <a:sym typeface="TT Lakes Neue Bold"/>
+              </a:rPr>
+              <a:t>YOU!</a:t>
+            </a:r>
+          </a:p>
+        </p:txBody>
+      </p:sp>
+      <p:sp>
+        <p:nvSpPr>
+          <p:cNvPr name="TextBox 7" id="7"/>
+          <p:cNvSpPr txBox="true"/>
+          <p:nvPr/>
+        </p:nvSpPr>
+        <p:spPr>
+          <a:xfrm rot="0">
+            <a:off x="6245623" y="3359600"/>
+            <a:ext cx="5796755" cy="1636709"/>
+          </a:xfrm>
+          <a:prstGeom prst="rect">
+            <a:avLst/>
+          </a:prstGeom>
+        </p:spPr>
+        <p:txBody>
+          <a:bodyPr anchor="t" rtlCol="false" tIns="0" lIns="0" bIns="0" rIns="0">
+            <a:spAutoFit/>
+          </a:bodyPr>
+          <a:lstStyle/>
+          <a:p>
+            <a:pPr algn="ctr">
+              <a:lnSpc>
+                <a:spcPts val="12523"/>
+              </a:lnSpc>
+              <a:spcBef>
+                <a:spcPct val="0"/>
+              </a:spcBef>
+            </a:pPr>
+            <a:r>
+              <a:rPr lang="en-US" b="true" sz="11814">
+                <a:solidFill>
+                  <a:srgbClr val="84E3F8"/>
+                </a:solidFill>
+                <a:latin typeface="TT Lakes Neue Bold"/>
+                <a:ea typeface="TT Lakes Neue Bold"/>
+                <a:cs typeface="TT Lakes Neue Bold"/>
+                <a:sym typeface="TT Lakes Neue Bold"/>
+              </a:rPr>
+              <a:t>THANK</a:t>
+            </a:r>
+          </a:p>
+        </p:txBody>
+      </p:sp>
+      <p:sp>
+        <p:nvSpPr>
+          <p:cNvPr name="TextBox 8" id="8"/>
+          <p:cNvSpPr txBox="true"/>
+          <p:nvPr/>
+        </p:nvSpPr>
+        <p:spPr>
+          <a:xfrm rot="0">
+            <a:off x="4766982" y="6453937"/>
+            <a:ext cx="8754036" cy="721541"/>
+          </a:xfrm>
+          <a:prstGeom prst="rect">
+            <a:avLst/>
+          </a:prstGeom>
+        </p:spPr>
+        <p:txBody>
+          <a:bodyPr anchor="t" rtlCol="false" tIns="0" lIns="0" bIns="0" rIns="0">
+            <a:spAutoFit/>
+          </a:bodyPr>
+          <a:lstStyle/>
+          <a:p>
+            <a:pPr algn="ctr">
+              <a:lnSpc>
+                <a:spcPts val="2703"/>
+              </a:lnSpc>
+              <a:spcBef>
+                <a:spcPct val="0"/>
+              </a:spcBef>
+            </a:pPr>
+            <a:r>
+              <a:rPr lang="en-US" sz="2550">
+                <a:solidFill>
+                  <a:srgbClr val="FFFFFF"/>
+                </a:solidFill>
+                <a:latin typeface="Raleway"/>
+                <a:ea typeface="Raleway"/>
+                <a:cs typeface="Raleway"/>
+                <a:sym typeface="Raleway"/>
+              </a:rPr>
+              <a:t>Thank you for exploring the potential of AI technology with us! Let’s shape the future together.</a:t>
+            </a:r>
+          </a:p>
+        </p:txBody>
+      </p:sp>
+      <p:sp>
+        <p:nvSpPr>
+          <p:cNvPr name="Freeform 9" id="9"/>
+          <p:cNvSpPr/>
+          <p:nvPr/>
+        </p:nvSpPr>
+        <p:spPr>
+          <a:xfrm flipH="false" flipV="false" rot="0">
+            <a:off x="2494121" y="857710"/>
+            <a:ext cx="1789958" cy="1757413"/>
+          </a:xfrm>
+          <a:custGeom>
+            <a:avLst/>
+            <a:gdLst/>
+            <a:ahLst/>
+            <a:cxnLst/>
+            <a:rect r="r" b="b" t="t" l="l"/>
+            <a:pathLst>
+              <a:path h="1757413" w="1789958">
+                <a:moveTo>
+                  <a:pt x="0" y="0"/>
+                </a:moveTo>
+                <a:lnTo>
+                  <a:pt x="1789958" y="0"/>
+                </a:lnTo>
+                <a:lnTo>
+                  <a:pt x="1789958" y="1757413"/>
+                </a:lnTo>
+                <a:lnTo>
+                  <a:pt x="0" y="1757413"/>
+                </a:lnTo>
+                <a:lnTo>
+                  <a:pt x="0" y="0"/>
+                </a:lnTo>
+                <a:close/>
+              </a:path>
+            </a:pathLst>
+          </a:custGeom>
+          <a:blipFill>
+            <a:blip r:embed="rId6">
+              <a:alphaModFix amt="27000"/>
+              <a:extLst>
+                <a:ext uri="{96DAC541-7B7A-43D3-8B79-37D633B846F1}">
+                  <asvg:svgBlip xmlns:asvg="http://schemas.microsoft.com/office/drawing/2016/SVG/main" r:embed="rId7"/>
+                </a:ext>
+              </a:extLst>
+            </a:blip>
+            <a:stretch>
+              <a:fillRect l="0" t="0" r="0" b="0"/>
+            </a:stretch>
+          </a:blipFill>
+        </p:spPr>
+      </p:sp>
+    </p:spTree>
+  </p:cSld>
+  <p:clrMapOvr>
+    <a:masterClrMapping/>
+  </p:clrMapOvr>
+</p:sld>
+</file>
+
+<file path=ppt/slides/slide13.xml><?xml version="1.0" encoding="utf-8"?>
 <p:sld xmlns:p="http://schemas.openxmlformats.org/presentationml/2006/main" xmlns:a="http://schemas.openxmlformats.org/drawingml/2006/main" xmlns:r="http://schemas.openxmlformats.org/officeDocument/2006/relationships">
   <p:cSld>
     <p:bg>
@@ -4818,524 +5864,7 @@
 </p:sld>
 </file>
 
-<file path=ppt/slides/slide12.xml><?xml version="1.0" encoding="utf-8"?>
-<p:sld xmlns:p="http://schemas.openxmlformats.org/presentationml/2006/main" xmlns:a="http://schemas.openxmlformats.org/drawingml/2006/main" xmlns:r="http://schemas.openxmlformats.org/officeDocument/2006/relationships">
-  <p:cSld>
-    <p:bg>
-      <p:bgPr>
-        <a:gradFill rotWithShape="true">
-          <a:gsLst>
-            <a:gs pos="0">
-              <a:srgbClr val="131F40">
-                <a:alpha val="100000"/>
-              </a:srgbClr>
-            </a:gs>
-            <a:gs pos="100000">
-              <a:srgbClr val="3D6D81">
-                <a:alpha val="100000"/>
-              </a:srgbClr>
-            </a:gs>
-          </a:gsLst>
-          <a:lin ang="5400000"/>
-        </a:gradFill>
-      </p:bgPr>
-    </p:bg>
-    <p:spTree>
-      <p:nvGrpSpPr>
-        <p:cNvPr id="1" name=""/>
-        <p:cNvGrpSpPr/>
-        <p:nvPr/>
-      </p:nvGrpSpPr>
-      <p:grpSpPr>
-        <a:xfrm>
-          <a:off x="0" y="0"/>
-          <a:ext cx="0" cy="0"/>
-          <a:chOff x="0" y="0"/>
-          <a:chExt cx="0" cy="0"/>
-        </a:xfrm>
-      </p:grpSpPr>
-      <p:sp>
-        <p:nvSpPr>
-          <p:cNvPr name="Freeform 2" id="2"/>
-          <p:cNvSpPr/>
-          <p:nvPr/>
-        </p:nvSpPr>
-        <p:spPr>
-          <a:xfrm flipH="false" flipV="false" rot="-5400000">
-            <a:off x="4984803" y="-1314334"/>
-            <a:ext cx="8318394" cy="13299759"/>
-          </a:xfrm>
-          <a:custGeom>
-            <a:avLst/>
-            <a:gdLst/>
-            <a:ahLst/>
-            <a:cxnLst/>
-            <a:rect r="r" b="b" t="t" l="l"/>
-            <a:pathLst>
-              <a:path h="13299759" w="8318394">
-                <a:moveTo>
-                  <a:pt x="0" y="0"/>
-                </a:moveTo>
-                <a:lnTo>
-                  <a:pt x="8318394" y="0"/>
-                </a:lnTo>
-                <a:lnTo>
-                  <a:pt x="8318394" y="13299759"/>
-                </a:lnTo>
-                <a:lnTo>
-                  <a:pt x="0" y="13299759"/>
-                </a:lnTo>
-                <a:lnTo>
-                  <a:pt x="0" y="0"/>
-                </a:lnTo>
-                <a:close/>
-              </a:path>
-            </a:pathLst>
-          </a:custGeom>
-          <a:blipFill>
-            <a:blip r:embed="rId2">
-              <a:extLst>
-                <a:ext uri="{96DAC541-7B7A-43D3-8B79-37D633B846F1}">
-                  <asvg:svgBlip xmlns:asvg="http://schemas.microsoft.com/office/drawing/2016/SVG/main" r:embed="rId3"/>
-                </a:ext>
-              </a:extLst>
-            </a:blip>
-            <a:stretch>
-              <a:fillRect l="0" t="0" r="0" b="0"/>
-            </a:stretch>
-          </a:blipFill>
-        </p:spPr>
-      </p:sp>
-      <p:sp>
-        <p:nvSpPr>
-          <p:cNvPr name="Freeform 3" id="3"/>
-          <p:cNvSpPr/>
-          <p:nvPr/>
-        </p:nvSpPr>
-        <p:spPr>
-          <a:xfrm flipH="false" flipV="false" rot="0">
-            <a:off x="8055515" y="2243991"/>
-            <a:ext cx="742265" cy="742265"/>
-          </a:xfrm>
-          <a:custGeom>
-            <a:avLst/>
-            <a:gdLst/>
-            <a:ahLst/>
-            <a:cxnLst/>
-            <a:rect r="r" b="b" t="t" l="l"/>
-            <a:pathLst>
-              <a:path h="742265" w="742265">
-                <a:moveTo>
-                  <a:pt x="0" y="0"/>
-                </a:moveTo>
-                <a:lnTo>
-                  <a:pt x="742264" y="0"/>
-                </a:lnTo>
-                <a:lnTo>
-                  <a:pt x="742264" y="742265"/>
-                </a:lnTo>
-                <a:lnTo>
-                  <a:pt x="0" y="742265"/>
-                </a:lnTo>
-                <a:lnTo>
-                  <a:pt x="0" y="0"/>
-                </a:lnTo>
-                <a:close/>
-              </a:path>
-            </a:pathLst>
-          </a:custGeom>
-          <a:blipFill>
-            <a:blip r:embed="rId4">
-              <a:extLst>
-                <a:ext uri="{96DAC541-7B7A-43D3-8B79-37D633B846F1}">
-                  <asvg:svgBlip xmlns:asvg="http://schemas.microsoft.com/office/drawing/2016/SVG/main" r:embed="rId5"/>
-                </a:ext>
-              </a:extLst>
-            </a:blip>
-            <a:stretch>
-              <a:fillRect l="0" t="0" r="0" b="0"/>
-            </a:stretch>
-          </a:blipFill>
-        </p:spPr>
-      </p:sp>
-      <p:sp>
-        <p:nvSpPr>
-          <p:cNvPr name="TextBox 4" id="4"/>
-          <p:cNvSpPr txBox="true"/>
-          <p:nvPr/>
-        </p:nvSpPr>
-        <p:spPr>
-          <a:xfrm rot="0">
-            <a:off x="9036112" y="2369168"/>
-            <a:ext cx="1418817" cy="520485"/>
-          </a:xfrm>
-          <a:prstGeom prst="rect">
-            <a:avLst/>
-          </a:prstGeom>
-        </p:spPr>
-        <p:txBody>
-          <a:bodyPr anchor="t" rtlCol="false" tIns="0" lIns="0" bIns="0" rIns="0">
-            <a:spAutoFit/>
-          </a:bodyPr>
-          <a:lstStyle/>
-          <a:p>
-            <a:pPr algn="l">
-              <a:lnSpc>
-                <a:spcPts val="2067"/>
-              </a:lnSpc>
-              <a:spcBef>
-                <a:spcPct val="0"/>
-              </a:spcBef>
-            </a:pPr>
-            <a:r>
-              <a:rPr lang="en-US" sz="1950">
-                <a:solidFill>
-                  <a:srgbClr val="FFFFFF"/>
-                </a:solidFill>
-                <a:latin typeface="TT Lakes Neue"/>
-                <a:ea typeface="TT Lakes Neue"/>
-                <a:cs typeface="TT Lakes Neue"/>
-                <a:sym typeface="TT Lakes Neue"/>
-              </a:rPr>
-              <a:t>STUDIO SHODWE</a:t>
-            </a:r>
-          </a:p>
-        </p:txBody>
-      </p:sp>
-      <p:sp>
-        <p:nvSpPr>
-          <p:cNvPr name="TextBox 5" id="5"/>
-          <p:cNvSpPr txBox="true"/>
-          <p:nvPr/>
-        </p:nvSpPr>
-        <p:spPr>
-          <a:xfrm rot="0">
-            <a:off x="16175678" y="1560323"/>
-            <a:ext cx="1418817" cy="263292"/>
-          </a:xfrm>
-          <a:prstGeom prst="rect">
-            <a:avLst/>
-          </a:prstGeom>
-        </p:spPr>
-        <p:txBody>
-          <a:bodyPr anchor="t" rtlCol="false" tIns="0" lIns="0" bIns="0" rIns="0">
-            <a:spAutoFit/>
-          </a:bodyPr>
-          <a:lstStyle/>
-          <a:p>
-            <a:pPr algn="l">
-              <a:lnSpc>
-                <a:spcPts val="2067"/>
-              </a:lnSpc>
-              <a:spcBef>
-                <a:spcPct val="0"/>
-              </a:spcBef>
-            </a:pPr>
-            <a:r>
-              <a:rPr lang="en-US" sz="1950">
-                <a:solidFill>
-                  <a:srgbClr val="FFFFFF"/>
-                </a:solidFill>
-                <a:latin typeface="TT Lakes Neue"/>
-                <a:ea typeface="TT Lakes Neue"/>
-                <a:cs typeface="TT Lakes Neue"/>
-                <a:sym typeface="TT Lakes Neue"/>
-              </a:rPr>
-              <a:t>PAGE 12</a:t>
-            </a:r>
-          </a:p>
-        </p:txBody>
-      </p:sp>
-      <p:sp>
-        <p:nvSpPr>
-          <p:cNvPr name="TextBox 6" id="6"/>
-          <p:cNvSpPr txBox="true"/>
-          <p:nvPr/>
-        </p:nvSpPr>
-        <p:spPr>
-          <a:xfrm rot="0">
-            <a:off x="6595089" y="4598153"/>
-            <a:ext cx="5097823" cy="1636709"/>
-          </a:xfrm>
-          <a:prstGeom prst="rect">
-            <a:avLst/>
-          </a:prstGeom>
-        </p:spPr>
-        <p:txBody>
-          <a:bodyPr anchor="t" rtlCol="false" tIns="0" lIns="0" bIns="0" rIns="0">
-            <a:spAutoFit/>
-          </a:bodyPr>
-          <a:lstStyle/>
-          <a:p>
-            <a:pPr algn="ctr">
-              <a:lnSpc>
-                <a:spcPts val="12523"/>
-              </a:lnSpc>
-              <a:spcBef>
-                <a:spcPct val="0"/>
-              </a:spcBef>
-            </a:pPr>
-            <a:r>
-              <a:rPr lang="en-US" b="true" sz="11814">
-                <a:solidFill>
-                  <a:srgbClr val="FFFFFF"/>
-                </a:solidFill>
-                <a:latin typeface="TT Lakes Neue Bold"/>
-                <a:ea typeface="TT Lakes Neue Bold"/>
-                <a:cs typeface="TT Lakes Neue Bold"/>
-                <a:sym typeface="TT Lakes Neue Bold"/>
-              </a:rPr>
-              <a:t>YOU!</a:t>
-            </a:r>
-          </a:p>
-        </p:txBody>
-      </p:sp>
-      <p:sp>
-        <p:nvSpPr>
-          <p:cNvPr name="TextBox 7" id="7"/>
-          <p:cNvSpPr txBox="true"/>
-          <p:nvPr/>
-        </p:nvSpPr>
-        <p:spPr>
-          <a:xfrm rot="0">
-            <a:off x="6245623" y="3359600"/>
-            <a:ext cx="5796755" cy="1636709"/>
-          </a:xfrm>
-          <a:prstGeom prst="rect">
-            <a:avLst/>
-          </a:prstGeom>
-        </p:spPr>
-        <p:txBody>
-          <a:bodyPr anchor="t" rtlCol="false" tIns="0" lIns="0" bIns="0" rIns="0">
-            <a:spAutoFit/>
-          </a:bodyPr>
-          <a:lstStyle/>
-          <a:p>
-            <a:pPr algn="ctr">
-              <a:lnSpc>
-                <a:spcPts val="12523"/>
-              </a:lnSpc>
-              <a:spcBef>
-                <a:spcPct val="0"/>
-              </a:spcBef>
-            </a:pPr>
-            <a:r>
-              <a:rPr lang="en-US" b="true" sz="11814">
-                <a:solidFill>
-                  <a:srgbClr val="84E3F8"/>
-                </a:solidFill>
-                <a:latin typeface="TT Lakes Neue Bold"/>
-                <a:ea typeface="TT Lakes Neue Bold"/>
-                <a:cs typeface="TT Lakes Neue Bold"/>
-                <a:sym typeface="TT Lakes Neue Bold"/>
-              </a:rPr>
-              <a:t>THANK</a:t>
-            </a:r>
-          </a:p>
-        </p:txBody>
-      </p:sp>
-      <p:sp>
-        <p:nvSpPr>
-          <p:cNvPr name="TextBox 8" id="8"/>
-          <p:cNvSpPr txBox="true"/>
-          <p:nvPr/>
-        </p:nvSpPr>
-        <p:spPr>
-          <a:xfrm rot="0">
-            <a:off x="4766982" y="6453937"/>
-            <a:ext cx="8754036" cy="721541"/>
-          </a:xfrm>
-          <a:prstGeom prst="rect">
-            <a:avLst/>
-          </a:prstGeom>
-        </p:spPr>
-        <p:txBody>
-          <a:bodyPr anchor="t" rtlCol="false" tIns="0" lIns="0" bIns="0" rIns="0">
-            <a:spAutoFit/>
-          </a:bodyPr>
-          <a:lstStyle/>
-          <a:p>
-            <a:pPr algn="ctr">
-              <a:lnSpc>
-                <a:spcPts val="2703"/>
-              </a:lnSpc>
-              <a:spcBef>
-                <a:spcPct val="0"/>
-              </a:spcBef>
-            </a:pPr>
-            <a:r>
-              <a:rPr lang="en-US" sz="2550">
-                <a:solidFill>
-                  <a:srgbClr val="FFFFFF"/>
-                </a:solidFill>
-                <a:latin typeface="Raleway"/>
-                <a:ea typeface="Raleway"/>
-                <a:cs typeface="Raleway"/>
-                <a:sym typeface="Raleway"/>
-              </a:rPr>
-              <a:t>Thank you for exploring the potential of AI technology with us! Let’s shape the future together.</a:t>
-            </a:r>
-          </a:p>
-        </p:txBody>
-      </p:sp>
-      <p:sp>
-        <p:nvSpPr>
-          <p:cNvPr name="Freeform 9" id="9"/>
-          <p:cNvSpPr/>
-          <p:nvPr/>
-        </p:nvSpPr>
-        <p:spPr>
-          <a:xfrm flipH="false" flipV="false" rot="0">
-            <a:off x="6935869" y="7590240"/>
-            <a:ext cx="4416262" cy="698572"/>
-          </a:xfrm>
-          <a:custGeom>
-            <a:avLst/>
-            <a:gdLst/>
-            <a:ahLst/>
-            <a:cxnLst/>
-            <a:rect r="r" b="b" t="t" l="l"/>
-            <a:pathLst>
-              <a:path h="698572" w="4416262">
-                <a:moveTo>
-                  <a:pt x="0" y="0"/>
-                </a:moveTo>
-                <a:lnTo>
-                  <a:pt x="4416262" y="0"/>
-                </a:lnTo>
-                <a:lnTo>
-                  <a:pt x="4416262" y="698572"/>
-                </a:lnTo>
-                <a:lnTo>
-                  <a:pt x="0" y="698572"/>
-                </a:lnTo>
-                <a:lnTo>
-                  <a:pt x="0" y="0"/>
-                </a:lnTo>
-                <a:close/>
-              </a:path>
-            </a:pathLst>
-          </a:custGeom>
-          <a:blipFill>
-            <a:blip r:embed="rId6">
-              <a:extLst>
-                <a:ext uri="{96DAC541-7B7A-43D3-8B79-37D633B846F1}">
-                  <asvg:svgBlip xmlns:asvg="http://schemas.microsoft.com/office/drawing/2016/SVG/main" r:embed="rId7"/>
-                </a:ext>
-              </a:extLst>
-            </a:blip>
-            <a:stretch>
-              <a:fillRect l="0" t="0" r="0" b="0"/>
-            </a:stretch>
-          </a:blipFill>
-        </p:spPr>
-      </p:sp>
-      <p:sp>
-        <p:nvSpPr>
-          <p:cNvPr name="TextBox 10" id="10"/>
-          <p:cNvSpPr txBox="true"/>
-          <p:nvPr/>
-        </p:nvSpPr>
-        <p:spPr>
-          <a:xfrm rot="0">
-            <a:off x="7579308" y="7809769"/>
-            <a:ext cx="3129384" cy="263292"/>
-          </a:xfrm>
-          <a:prstGeom prst="rect">
-            <a:avLst/>
-          </a:prstGeom>
-        </p:spPr>
-        <p:txBody>
-          <a:bodyPr anchor="t" rtlCol="false" tIns="0" lIns="0" bIns="0" rIns="0">
-            <a:spAutoFit/>
-          </a:bodyPr>
-          <a:lstStyle/>
-          <a:p>
-            <a:pPr algn="l">
-              <a:lnSpc>
-                <a:spcPts val="2067"/>
-              </a:lnSpc>
-              <a:spcBef>
-                <a:spcPct val="0"/>
-              </a:spcBef>
-            </a:pPr>
-            <a:r>
-              <a:rPr lang="en-US" sz="1950">
-                <a:solidFill>
-                  <a:srgbClr val="FFFFFF"/>
-                </a:solidFill>
-                <a:latin typeface="TT Lakes Neue"/>
-                <a:ea typeface="TT Lakes Neue"/>
-                <a:cs typeface="TT Lakes Neue"/>
-                <a:sym typeface="TT Lakes Neue"/>
-              </a:rPr>
-              <a:t>www.reallygreatsite.com</a:t>
-            </a:r>
-          </a:p>
-        </p:txBody>
-      </p:sp>
-      <p:sp>
-        <p:nvSpPr>
-          <p:cNvPr name="Freeform 11" id="11"/>
-          <p:cNvSpPr/>
-          <p:nvPr/>
-        </p:nvSpPr>
-        <p:spPr>
-          <a:xfrm flipH="false" flipV="false" rot="0">
-            <a:off x="2494121" y="857710"/>
-            <a:ext cx="1789958" cy="1757413"/>
-          </a:xfrm>
-          <a:custGeom>
-            <a:avLst/>
-            <a:gdLst/>
-            <a:ahLst/>
-            <a:cxnLst/>
-            <a:rect r="r" b="b" t="t" l="l"/>
-            <a:pathLst>
-              <a:path h="1757413" w="1789958">
-                <a:moveTo>
-                  <a:pt x="0" y="0"/>
-                </a:moveTo>
-                <a:lnTo>
-                  <a:pt x="1789958" y="0"/>
-                </a:lnTo>
-                <a:lnTo>
-                  <a:pt x="1789958" y="1757413"/>
-                </a:lnTo>
-                <a:lnTo>
-                  <a:pt x="0" y="1757413"/>
-                </a:lnTo>
-                <a:lnTo>
-                  <a:pt x="0" y="0"/>
-                </a:lnTo>
-                <a:close/>
-              </a:path>
-            </a:pathLst>
-          </a:custGeom>
-          <a:blipFill>
-            <a:blip r:embed="rId8">
-              <a:alphaModFix amt="27000"/>
-              <a:extLst>
-                <a:ext uri="{96DAC541-7B7A-43D3-8B79-37D633B846F1}">
-                  <asvg:svgBlip xmlns:asvg="http://schemas.microsoft.com/office/drawing/2016/SVG/main" r:embed="rId9"/>
-                </a:ext>
-              </a:extLst>
-            </a:blip>
-            <a:stretch>
-              <a:fillRect l="0" t="0" r="0" b="0"/>
-            </a:stretch>
-          </a:blipFill>
-        </p:spPr>
-      </p:sp>
-    </p:spTree>
-  </p:cSld>
-  <p:clrMapOvr>
-    <a:masterClrMapping/>
-  </p:clrMapOvr>
-</p:sld>
-</file>
-
-<file path=ppt/slides/slide13.xml><?xml version="1.0" encoding="utf-8"?>
+<file path=ppt/slides/slide14.xml><?xml version="1.0" encoding="utf-8"?>
 <p:sld xmlns:p="http://schemas.openxmlformats.org/presentationml/2006/main" xmlns:a="http://schemas.openxmlformats.org/drawingml/2006/main" xmlns:r="http://schemas.openxmlformats.org/officeDocument/2006/relationships">
   <p:cSld>
     <p:bg>
@@ -6044,815 +6573,6 @@
                 <a:sym typeface="TT Lakes Neue"/>
               </a:rPr>
               <a:t>www.reallygreatsite.com</a:t>
-            </a:r>
-          </a:p>
-        </p:txBody>
-      </p:sp>
-    </p:spTree>
-  </p:cSld>
-  <p:clrMapOvr>
-    <a:masterClrMapping/>
-  </p:clrMapOvr>
-</p:sld>
-</file>
-
-<file path=ppt/slides/slide14.xml><?xml version="1.0" encoding="utf-8"?>
-<p:sld xmlns:p="http://schemas.openxmlformats.org/presentationml/2006/main" xmlns:a="http://schemas.openxmlformats.org/drawingml/2006/main" xmlns:r="http://schemas.openxmlformats.org/officeDocument/2006/relationships">
-  <p:cSld>
-    <p:bg>
-      <p:bgPr>
-        <a:gradFill rotWithShape="true">
-          <a:gsLst>
-            <a:gs pos="0">
-              <a:srgbClr val="131F40">
-                <a:alpha val="100000"/>
-              </a:srgbClr>
-            </a:gs>
-            <a:gs pos="100000">
-              <a:srgbClr val="3D6D81">
-                <a:alpha val="100000"/>
-              </a:srgbClr>
-            </a:gs>
-          </a:gsLst>
-          <a:lin ang="5400000"/>
-        </a:gradFill>
-      </p:bgPr>
-    </p:bg>
-    <p:spTree>
-      <p:nvGrpSpPr>
-        <p:cNvPr id="1" name=""/>
-        <p:cNvGrpSpPr/>
-        <p:nvPr/>
-      </p:nvGrpSpPr>
-      <p:grpSpPr>
-        <a:xfrm>
-          <a:off x="0" y="0"/>
-          <a:ext cx="0" cy="0"/>
-          <a:chOff x="0" y="0"/>
-          <a:chExt cx="0" cy="0"/>
-        </a:xfrm>
-      </p:grpSpPr>
-      <p:sp>
-        <p:nvSpPr>
-          <p:cNvPr name="Freeform 2" id="2"/>
-          <p:cNvSpPr/>
-          <p:nvPr/>
-        </p:nvSpPr>
-        <p:spPr>
-          <a:xfrm flipH="false" flipV="false" rot="0">
-            <a:off x="1711939" y="1306549"/>
-            <a:ext cx="742265" cy="742265"/>
-          </a:xfrm>
-          <a:custGeom>
-            <a:avLst/>
-            <a:gdLst/>
-            <a:ahLst/>
-            <a:cxnLst/>
-            <a:rect r="r" b="b" t="t" l="l"/>
-            <a:pathLst>
-              <a:path h="742265" w="742265">
-                <a:moveTo>
-                  <a:pt x="0" y="0"/>
-                </a:moveTo>
-                <a:lnTo>
-                  <a:pt x="742264" y="0"/>
-                </a:lnTo>
-                <a:lnTo>
-                  <a:pt x="742264" y="742265"/>
-                </a:lnTo>
-                <a:lnTo>
-                  <a:pt x="0" y="742265"/>
-                </a:lnTo>
-                <a:lnTo>
-                  <a:pt x="0" y="0"/>
-                </a:lnTo>
-                <a:close/>
-              </a:path>
-            </a:pathLst>
-          </a:custGeom>
-          <a:blipFill>
-            <a:blip r:embed="rId2">
-              <a:extLst>
-                <a:ext uri="{96DAC541-7B7A-43D3-8B79-37D633B846F1}">
-                  <asvg:svgBlip xmlns:asvg="http://schemas.microsoft.com/office/drawing/2016/SVG/main" r:embed="rId3"/>
-                </a:ext>
-              </a:extLst>
-            </a:blip>
-            <a:stretch>
-              <a:fillRect l="0" t="0" r="0" b="0"/>
-            </a:stretch>
-          </a:blipFill>
-        </p:spPr>
-      </p:sp>
-      <p:sp>
-        <p:nvSpPr>
-          <p:cNvPr name="Freeform 3" id="3"/>
-          <p:cNvSpPr/>
-          <p:nvPr/>
-        </p:nvSpPr>
-        <p:spPr>
-          <a:xfrm flipH="false" flipV="false" rot="0">
-            <a:off x="4111353" y="1495490"/>
-            <a:ext cx="9756040" cy="2447879"/>
-          </a:xfrm>
-          <a:custGeom>
-            <a:avLst/>
-            <a:gdLst/>
-            <a:ahLst/>
-            <a:cxnLst/>
-            <a:rect r="r" b="b" t="t" l="l"/>
-            <a:pathLst>
-              <a:path h="2447879" w="9756040">
-                <a:moveTo>
-                  <a:pt x="0" y="0"/>
-                </a:moveTo>
-                <a:lnTo>
-                  <a:pt x="9756040" y="0"/>
-                </a:lnTo>
-                <a:lnTo>
-                  <a:pt x="9756040" y="2447879"/>
-                </a:lnTo>
-                <a:lnTo>
-                  <a:pt x="0" y="2447879"/>
-                </a:lnTo>
-                <a:lnTo>
-                  <a:pt x="0" y="0"/>
-                </a:lnTo>
-                <a:close/>
-              </a:path>
-            </a:pathLst>
-          </a:custGeom>
-          <a:blipFill>
-            <a:blip r:embed="rId4">
-              <a:extLst>
-                <a:ext uri="{96DAC541-7B7A-43D3-8B79-37D633B846F1}">
-                  <asvg:svgBlip xmlns:asvg="http://schemas.microsoft.com/office/drawing/2016/SVG/main" r:embed="rId5"/>
-                </a:ext>
-              </a:extLst>
-            </a:blip>
-            <a:stretch>
-              <a:fillRect l="0" t="0" r="0" b="0"/>
-            </a:stretch>
-          </a:blipFill>
-        </p:spPr>
-      </p:sp>
-      <p:grpSp>
-        <p:nvGrpSpPr>
-          <p:cNvPr name="Group 4" id="4"/>
-          <p:cNvGrpSpPr/>
-          <p:nvPr/>
-        </p:nvGrpSpPr>
-        <p:grpSpPr>
-          <a:xfrm rot="0">
-            <a:off x="-200474" y="4192382"/>
-            <a:ext cx="18688947" cy="3721654"/>
-            <a:chOff x="0" y="0"/>
-            <a:chExt cx="4922192" cy="980189"/>
-          </a:xfrm>
-        </p:grpSpPr>
-        <p:sp>
-          <p:nvSpPr>
-            <p:cNvPr name="Freeform 5" id="5"/>
-            <p:cNvSpPr/>
-            <p:nvPr/>
-          </p:nvSpPr>
-          <p:spPr>
-            <a:xfrm flipH="false" flipV="false" rot="0">
-              <a:off x="0" y="0"/>
-              <a:ext cx="4922192" cy="980189"/>
-            </a:xfrm>
-            <a:custGeom>
-              <a:avLst/>
-              <a:gdLst/>
-              <a:ahLst/>
-              <a:cxnLst/>
-              <a:rect r="r" b="b" t="t" l="l"/>
-              <a:pathLst>
-                <a:path h="980189" w="4922192">
-                  <a:moveTo>
-                    <a:pt x="0" y="0"/>
-                  </a:moveTo>
-                  <a:lnTo>
-                    <a:pt x="4922192" y="0"/>
-                  </a:lnTo>
-                  <a:lnTo>
-                    <a:pt x="4922192" y="980189"/>
-                  </a:lnTo>
-                  <a:lnTo>
-                    <a:pt x="0" y="980189"/>
-                  </a:lnTo>
-                  <a:close/>
-                </a:path>
-              </a:pathLst>
-            </a:custGeom>
-            <a:gradFill rotWithShape="true">
-              <a:gsLst>
-                <a:gs pos="0">
-                  <a:srgbClr val="131F40">
-                    <a:alpha val="75000"/>
-                  </a:srgbClr>
-                </a:gs>
-                <a:gs pos="100000">
-                  <a:srgbClr val="3D6D81">
-                    <a:alpha val="75000"/>
-                  </a:srgbClr>
-                </a:gs>
-              </a:gsLst>
-              <a:lin ang="0"/>
-            </a:gradFill>
-          </p:spPr>
-        </p:sp>
-        <p:sp>
-          <p:nvSpPr>
-            <p:cNvPr name="TextBox 6" id="6"/>
-            <p:cNvSpPr txBox="true"/>
-            <p:nvPr/>
-          </p:nvSpPr>
-          <p:spPr>
-            <a:xfrm>
-              <a:off x="0" y="28575"/>
-              <a:ext cx="4922192" cy="951614"/>
-            </a:xfrm>
-            <a:prstGeom prst="rect">
-              <a:avLst/>
-            </a:prstGeom>
-          </p:spPr>
-          <p:txBody>
-            <a:bodyPr anchor="ctr" rtlCol="false" tIns="50800" lIns="50800" bIns="50800" rIns="50800"/>
-            <a:lstStyle/>
-            <a:p>
-              <a:pPr algn="ctr">
-                <a:lnSpc>
-                  <a:spcPts val="2181"/>
-                </a:lnSpc>
-              </a:pPr>
-            </a:p>
-          </p:txBody>
-        </p:sp>
-      </p:grpSp>
-      <p:sp>
-        <p:nvSpPr>
-          <p:cNvPr name="Freeform 7" id="7"/>
-          <p:cNvSpPr/>
-          <p:nvPr/>
-        </p:nvSpPr>
-        <p:spPr>
-          <a:xfrm flipH="false" flipV="false" rot="0">
-            <a:off x="1711939" y="4813380"/>
-            <a:ext cx="887220" cy="871089"/>
-          </a:xfrm>
-          <a:custGeom>
-            <a:avLst/>
-            <a:gdLst/>
-            <a:ahLst/>
-            <a:cxnLst/>
-            <a:rect r="r" b="b" t="t" l="l"/>
-            <a:pathLst>
-              <a:path h="871089" w="887220">
-                <a:moveTo>
-                  <a:pt x="0" y="0"/>
-                </a:moveTo>
-                <a:lnTo>
-                  <a:pt x="887220" y="0"/>
-                </a:lnTo>
-                <a:lnTo>
-                  <a:pt x="887220" y="871089"/>
-                </a:lnTo>
-                <a:lnTo>
-                  <a:pt x="0" y="871089"/>
-                </a:lnTo>
-                <a:lnTo>
-                  <a:pt x="0" y="0"/>
-                </a:lnTo>
-                <a:close/>
-              </a:path>
-            </a:pathLst>
-          </a:custGeom>
-          <a:blipFill>
-            <a:blip r:embed="rId6">
-              <a:alphaModFix amt="72000"/>
-              <a:extLst>
-                <a:ext uri="{96DAC541-7B7A-43D3-8B79-37D633B846F1}">
-                  <asvg:svgBlip xmlns:asvg="http://schemas.microsoft.com/office/drawing/2016/SVG/main" r:embed="rId7"/>
-                </a:ext>
-              </a:extLst>
-            </a:blip>
-            <a:stretch>
-              <a:fillRect l="0" t="0" r="0" b="0"/>
-            </a:stretch>
-          </a:blipFill>
-        </p:spPr>
-      </p:sp>
-      <p:sp>
-        <p:nvSpPr>
-          <p:cNvPr name="Freeform 8" id="8"/>
-          <p:cNvSpPr/>
-          <p:nvPr/>
-        </p:nvSpPr>
-        <p:spPr>
-          <a:xfrm flipH="false" flipV="false" rot="0">
-            <a:off x="6940091" y="4813380"/>
-            <a:ext cx="887220" cy="871089"/>
-          </a:xfrm>
-          <a:custGeom>
-            <a:avLst/>
-            <a:gdLst/>
-            <a:ahLst/>
-            <a:cxnLst/>
-            <a:rect r="r" b="b" t="t" l="l"/>
-            <a:pathLst>
-              <a:path h="871089" w="887220">
-                <a:moveTo>
-                  <a:pt x="0" y="0"/>
-                </a:moveTo>
-                <a:lnTo>
-                  <a:pt x="887220" y="0"/>
-                </a:lnTo>
-                <a:lnTo>
-                  <a:pt x="887220" y="871089"/>
-                </a:lnTo>
-                <a:lnTo>
-                  <a:pt x="0" y="871089"/>
-                </a:lnTo>
-                <a:lnTo>
-                  <a:pt x="0" y="0"/>
-                </a:lnTo>
-                <a:close/>
-              </a:path>
-            </a:pathLst>
-          </a:custGeom>
-          <a:blipFill>
-            <a:blip r:embed="rId6">
-              <a:alphaModFix amt="72000"/>
-              <a:extLst>
-                <a:ext uri="{96DAC541-7B7A-43D3-8B79-37D633B846F1}">
-                  <asvg:svgBlip xmlns:asvg="http://schemas.microsoft.com/office/drawing/2016/SVG/main" r:embed="rId7"/>
-                </a:ext>
-              </a:extLst>
-            </a:blip>
-            <a:stretch>
-              <a:fillRect l="0" t="0" r="0" b="0"/>
-            </a:stretch>
-          </a:blipFill>
-        </p:spPr>
-      </p:sp>
-      <p:sp>
-        <p:nvSpPr>
-          <p:cNvPr name="Freeform 9" id="9"/>
-          <p:cNvSpPr/>
-          <p:nvPr/>
-        </p:nvSpPr>
-        <p:spPr>
-          <a:xfrm flipH="false" flipV="false" rot="0">
-            <a:off x="3493371" y="5950442"/>
-            <a:ext cx="11301259" cy="3927187"/>
-          </a:xfrm>
-          <a:custGeom>
-            <a:avLst/>
-            <a:gdLst/>
-            <a:ahLst/>
-            <a:cxnLst/>
-            <a:rect r="r" b="b" t="t" l="l"/>
-            <a:pathLst>
-              <a:path h="3927187" w="11301259">
-                <a:moveTo>
-                  <a:pt x="0" y="0"/>
-                </a:moveTo>
-                <a:lnTo>
-                  <a:pt x="11301258" y="0"/>
-                </a:lnTo>
-                <a:lnTo>
-                  <a:pt x="11301258" y="3927188"/>
-                </a:lnTo>
-                <a:lnTo>
-                  <a:pt x="0" y="3927188"/>
-                </a:lnTo>
-                <a:lnTo>
-                  <a:pt x="0" y="0"/>
-                </a:lnTo>
-                <a:close/>
-              </a:path>
-            </a:pathLst>
-          </a:custGeom>
-          <a:blipFill>
-            <a:blip r:embed="rId8"/>
-            <a:stretch>
-              <a:fillRect l="0" t="0" r="0" b="0"/>
-            </a:stretch>
-          </a:blipFill>
-        </p:spPr>
-      </p:sp>
-      <p:sp>
-        <p:nvSpPr>
-          <p:cNvPr name="TextBox 10" id="10"/>
-          <p:cNvSpPr txBox="true"/>
-          <p:nvPr/>
-        </p:nvSpPr>
-        <p:spPr>
-          <a:xfrm rot="0">
-            <a:off x="8184071" y="2646157"/>
-            <a:ext cx="1919859" cy="688975"/>
-          </a:xfrm>
-          <a:prstGeom prst="rect">
-            <a:avLst/>
-          </a:prstGeom>
-        </p:spPr>
-        <p:txBody>
-          <a:bodyPr anchor="t" rtlCol="false" tIns="0" lIns="0" bIns="0" rIns="0">
-            <a:spAutoFit/>
-          </a:bodyPr>
-          <a:lstStyle/>
-          <a:p>
-            <a:pPr algn="l">
-              <a:lnSpc>
-                <a:spcPts val="5300"/>
-              </a:lnSpc>
-              <a:spcBef>
-                <a:spcPct val="0"/>
-              </a:spcBef>
-            </a:pPr>
-            <a:r>
-              <a:rPr lang="en-US" b="true" sz="5000">
-                <a:solidFill>
-                  <a:srgbClr val="FFFFFF"/>
-                </a:solidFill>
-                <a:latin typeface="TT Lakes Neue Bold"/>
-                <a:ea typeface="TT Lakes Neue Bold"/>
-                <a:cs typeface="TT Lakes Neue Bold"/>
-                <a:sym typeface="TT Lakes Neue Bold"/>
-              </a:rPr>
-              <a:t>PLAN</a:t>
-            </a:r>
-          </a:p>
-        </p:txBody>
-      </p:sp>
-      <p:sp>
-        <p:nvSpPr>
-          <p:cNvPr name="TextBox 11" id="11"/>
-          <p:cNvSpPr txBox="true"/>
-          <p:nvPr/>
-        </p:nvSpPr>
-        <p:spPr>
-          <a:xfrm rot="0">
-            <a:off x="6334246" y="2018887"/>
-            <a:ext cx="6560959" cy="645541"/>
-          </a:xfrm>
-          <a:prstGeom prst="rect">
-            <a:avLst/>
-          </a:prstGeom>
-        </p:spPr>
-        <p:txBody>
-          <a:bodyPr anchor="t" rtlCol="false" tIns="0" lIns="0" bIns="0" rIns="0">
-            <a:spAutoFit/>
-          </a:bodyPr>
-          <a:lstStyle/>
-          <a:p>
-            <a:pPr algn="l">
-              <a:lnSpc>
-                <a:spcPts val="4982"/>
-              </a:lnSpc>
-              <a:spcBef>
-                <a:spcPct val="0"/>
-              </a:spcBef>
-            </a:pPr>
-            <a:r>
-              <a:rPr lang="en-US" b="true" sz="4700">
-                <a:solidFill>
-                  <a:srgbClr val="84E3F8"/>
-                </a:solidFill>
-                <a:latin typeface="TT Lakes Neue Bold"/>
-                <a:ea typeface="TT Lakes Neue Bold"/>
-                <a:cs typeface="TT Lakes Neue Bold"/>
-                <a:sym typeface="TT Lakes Neue Bold"/>
-              </a:rPr>
-              <a:t>IMPLEMENTATION </a:t>
-            </a:r>
-          </a:p>
-        </p:txBody>
-      </p:sp>
-      <p:sp>
-        <p:nvSpPr>
-          <p:cNvPr name="TextBox 12" id="12"/>
-          <p:cNvSpPr txBox="true"/>
-          <p:nvPr/>
-        </p:nvSpPr>
-        <p:spPr>
-          <a:xfrm rot="0">
-            <a:off x="16175678" y="1560323"/>
-            <a:ext cx="1418817" cy="263273"/>
-          </a:xfrm>
-          <a:prstGeom prst="rect">
-            <a:avLst/>
-          </a:prstGeom>
-        </p:spPr>
-        <p:txBody>
-          <a:bodyPr anchor="t" rtlCol="false" tIns="0" lIns="0" bIns="0" rIns="0">
-            <a:spAutoFit/>
-          </a:bodyPr>
-          <a:lstStyle/>
-          <a:p>
-            <a:pPr algn="l">
-              <a:lnSpc>
-                <a:spcPts val="2067"/>
-              </a:lnSpc>
-              <a:spcBef>
-                <a:spcPct val="0"/>
-              </a:spcBef>
-            </a:pPr>
-            <a:r>
-              <a:rPr lang="en-US" sz="1950">
-                <a:solidFill>
-                  <a:srgbClr val="FFFFFF"/>
-                </a:solidFill>
-                <a:latin typeface="TT Lakes Neue"/>
-                <a:ea typeface="TT Lakes Neue"/>
-                <a:cs typeface="TT Lakes Neue"/>
-                <a:sym typeface="TT Lakes Neue"/>
-              </a:rPr>
-              <a:t>PAGE 08</a:t>
-            </a:r>
-          </a:p>
-        </p:txBody>
-      </p:sp>
-      <p:sp>
-        <p:nvSpPr>
-          <p:cNvPr name="TextBox 13" id="13"/>
-          <p:cNvSpPr txBox="true"/>
-          <p:nvPr/>
-        </p:nvSpPr>
-        <p:spPr>
-          <a:xfrm rot="0">
-            <a:off x="2155549" y="5131567"/>
-            <a:ext cx="283352" cy="263292"/>
-          </a:xfrm>
-          <a:prstGeom prst="rect">
-            <a:avLst/>
-          </a:prstGeom>
-        </p:spPr>
-        <p:txBody>
-          <a:bodyPr anchor="t" rtlCol="false" tIns="0" lIns="0" bIns="0" rIns="0">
-            <a:spAutoFit/>
-          </a:bodyPr>
-          <a:lstStyle/>
-          <a:p>
-            <a:pPr algn="l">
-              <a:lnSpc>
-                <a:spcPts val="2067"/>
-              </a:lnSpc>
-              <a:spcBef>
-                <a:spcPct val="0"/>
-              </a:spcBef>
-            </a:pPr>
-            <a:r>
-              <a:rPr lang="en-US" sz="1950">
-                <a:solidFill>
-                  <a:srgbClr val="FFFFFF"/>
-                </a:solidFill>
-                <a:latin typeface="TT Lakes Neue"/>
-                <a:ea typeface="TT Lakes Neue"/>
-                <a:cs typeface="TT Lakes Neue"/>
-                <a:sym typeface="TT Lakes Neue"/>
-              </a:rPr>
-              <a:t>1.</a:t>
-            </a:r>
-          </a:p>
-        </p:txBody>
-      </p:sp>
-      <p:sp>
-        <p:nvSpPr>
-          <p:cNvPr name="TextBox 14" id="14"/>
-          <p:cNvSpPr txBox="true"/>
-          <p:nvPr/>
-        </p:nvSpPr>
-        <p:spPr>
-          <a:xfrm rot="0">
-            <a:off x="2862199" y="5703519"/>
-            <a:ext cx="3811192" cy="293766"/>
-          </a:xfrm>
-          <a:prstGeom prst="rect">
-            <a:avLst/>
-          </a:prstGeom>
-        </p:spPr>
-        <p:txBody>
-          <a:bodyPr anchor="t" rtlCol="false" tIns="0" lIns="0" bIns="0" rIns="0">
-            <a:spAutoFit/>
-          </a:bodyPr>
-          <a:lstStyle/>
-          <a:p>
-            <a:pPr algn="l">
-              <a:lnSpc>
-                <a:spcPts val="2181"/>
-              </a:lnSpc>
-              <a:spcBef>
-                <a:spcPct val="0"/>
-              </a:spcBef>
-            </a:pPr>
-            <a:r>
-              <a:rPr lang="en-US" b="true" sz="2058">
-                <a:solidFill>
-                  <a:srgbClr val="FFFFFF"/>
-                </a:solidFill>
-                <a:latin typeface="Raleway Bold"/>
-                <a:ea typeface="Raleway Bold"/>
-                <a:cs typeface="Raleway Bold"/>
-                <a:sym typeface="Raleway Bold"/>
-              </a:rPr>
-              <a:t>...</a:t>
-            </a:r>
-          </a:p>
-        </p:txBody>
-      </p:sp>
-      <p:sp>
-        <p:nvSpPr>
-          <p:cNvPr name="TextBox 15" id="15"/>
-          <p:cNvSpPr txBox="true"/>
-          <p:nvPr/>
-        </p:nvSpPr>
-        <p:spPr>
-          <a:xfrm rot="0">
-            <a:off x="7383701" y="5131567"/>
-            <a:ext cx="283352" cy="263292"/>
-          </a:xfrm>
-          <a:prstGeom prst="rect">
-            <a:avLst/>
-          </a:prstGeom>
-        </p:spPr>
-        <p:txBody>
-          <a:bodyPr anchor="t" rtlCol="false" tIns="0" lIns="0" bIns="0" rIns="0">
-            <a:spAutoFit/>
-          </a:bodyPr>
-          <a:lstStyle/>
-          <a:p>
-            <a:pPr algn="l">
-              <a:lnSpc>
-                <a:spcPts val="2067"/>
-              </a:lnSpc>
-              <a:spcBef>
-                <a:spcPct val="0"/>
-              </a:spcBef>
-            </a:pPr>
-            <a:r>
-              <a:rPr lang="en-US" sz="1950">
-                <a:solidFill>
-                  <a:srgbClr val="FFFFFF"/>
-                </a:solidFill>
-                <a:latin typeface="TT Lakes Neue"/>
-                <a:ea typeface="TT Lakes Neue"/>
-                <a:cs typeface="TT Lakes Neue"/>
-                <a:sym typeface="TT Lakes Neue"/>
-              </a:rPr>
-              <a:t>2.</a:t>
-            </a:r>
-          </a:p>
-        </p:txBody>
-      </p:sp>
-      <p:sp>
-        <p:nvSpPr>
-          <p:cNvPr name="TextBox 16" id="16"/>
-          <p:cNvSpPr txBox="true"/>
-          <p:nvPr/>
-        </p:nvSpPr>
-        <p:spPr>
-          <a:xfrm rot="0">
-            <a:off x="8090352" y="5703519"/>
-            <a:ext cx="3811192" cy="293766"/>
-          </a:xfrm>
-          <a:prstGeom prst="rect">
-            <a:avLst/>
-          </a:prstGeom>
-        </p:spPr>
-        <p:txBody>
-          <a:bodyPr anchor="t" rtlCol="false" tIns="0" lIns="0" bIns="0" rIns="0">
-            <a:spAutoFit/>
-          </a:bodyPr>
-          <a:lstStyle/>
-          <a:p>
-            <a:pPr algn="l">
-              <a:lnSpc>
-                <a:spcPts val="2181"/>
-              </a:lnSpc>
-              <a:spcBef>
-                <a:spcPct val="0"/>
-              </a:spcBef>
-            </a:pPr>
-            <a:r>
-              <a:rPr lang="en-US" b="true" sz="2058">
-                <a:solidFill>
-                  <a:srgbClr val="FFFFFF"/>
-                </a:solidFill>
-                <a:latin typeface="Raleway Bold"/>
-                <a:ea typeface="Raleway Bold"/>
-                <a:cs typeface="Raleway Bold"/>
-                <a:sym typeface="Raleway Bold"/>
-              </a:rPr>
-              <a:t>...</a:t>
-            </a:r>
-          </a:p>
-        </p:txBody>
-      </p:sp>
-      <p:sp>
-        <p:nvSpPr>
-          <p:cNvPr name="TextBox 17" id="17"/>
-          <p:cNvSpPr txBox="true"/>
-          <p:nvPr/>
-        </p:nvSpPr>
-        <p:spPr>
-          <a:xfrm rot="0">
-            <a:off x="13318504" y="5703519"/>
-            <a:ext cx="3811192" cy="293766"/>
-          </a:xfrm>
-          <a:prstGeom prst="rect">
-            <a:avLst/>
-          </a:prstGeom>
-        </p:spPr>
-        <p:txBody>
-          <a:bodyPr anchor="t" rtlCol="false" tIns="0" lIns="0" bIns="0" rIns="0">
-            <a:spAutoFit/>
-          </a:bodyPr>
-          <a:lstStyle/>
-          <a:p>
-            <a:pPr algn="l">
-              <a:lnSpc>
-                <a:spcPts val="2181"/>
-              </a:lnSpc>
-              <a:spcBef>
-                <a:spcPct val="0"/>
-              </a:spcBef>
-            </a:pPr>
-            <a:r>
-              <a:rPr lang="en-US" b="true" sz="2058">
-                <a:solidFill>
-                  <a:srgbClr val="FFFFFF"/>
-                </a:solidFill>
-                <a:latin typeface="Raleway Bold"/>
-                <a:ea typeface="Raleway Bold"/>
-                <a:cs typeface="Raleway Bold"/>
-                <a:sym typeface="Raleway Bold"/>
-              </a:rPr>
-              <a:t>...</a:t>
-            </a:r>
-          </a:p>
-        </p:txBody>
-      </p:sp>
-      <p:sp>
-        <p:nvSpPr>
-          <p:cNvPr name="TextBox 18" id="18"/>
-          <p:cNvSpPr txBox="true"/>
-          <p:nvPr/>
-        </p:nvSpPr>
-        <p:spPr>
-          <a:xfrm rot="0">
-            <a:off x="2692536" y="1431726"/>
-            <a:ext cx="3943940" cy="520448"/>
-          </a:xfrm>
-          <a:prstGeom prst="rect">
-            <a:avLst/>
-          </a:prstGeom>
-        </p:spPr>
-        <p:txBody>
-          <a:bodyPr anchor="t" rtlCol="false" tIns="0" lIns="0" bIns="0" rIns="0">
-            <a:spAutoFit/>
-          </a:bodyPr>
-          <a:lstStyle/>
-          <a:p>
-            <a:pPr algn="l">
-              <a:lnSpc>
-                <a:spcPts val="2067"/>
-              </a:lnSpc>
-            </a:pPr>
-            <a:r>
-              <a:rPr lang="en-US" sz="1950">
-                <a:solidFill>
-                  <a:srgbClr val="FFFFFF"/>
-                </a:solidFill>
-                <a:latin typeface="TT Lakes Neue"/>
-                <a:ea typeface="TT Lakes Neue"/>
-                <a:cs typeface="TT Lakes Neue"/>
-                <a:sym typeface="TT Lakes Neue"/>
-              </a:rPr>
-              <a:t>LEHIGH UNIVERSITY</a:t>
-            </a:r>
-          </a:p>
-          <a:p>
-            <a:pPr algn="l">
-              <a:lnSpc>
-                <a:spcPts val="2067"/>
-              </a:lnSpc>
-              <a:spcBef>
-                <a:spcPct val="0"/>
-              </a:spcBef>
-            </a:pPr>
-            <a:r>
-              <a:rPr lang="en-US" sz="1950">
-                <a:solidFill>
-                  <a:srgbClr val="FFFFFF"/>
-                </a:solidFill>
-                <a:latin typeface="TT Lakes Neue"/>
-                <a:ea typeface="TT Lakes Neue"/>
-                <a:cs typeface="TT Lakes Neue"/>
-                <a:sym typeface="TT Lakes Neue"/>
-              </a:rPr>
-              <a:t>DATA SCIENCE</a:t>
             </a:r>
           </a:p>
         </p:txBody>
@@ -12478,6 +12198,529 @@
           <a:chExt cx="0" cy="0"/>
         </a:xfrm>
       </p:grpSpPr>
+      <p:sp>
+        <p:nvSpPr>
+          <p:cNvPr name="Freeform 2" id="2"/>
+          <p:cNvSpPr/>
+          <p:nvPr/>
+        </p:nvSpPr>
+        <p:spPr>
+          <a:xfrm flipH="false" flipV="false" rot="0">
+            <a:off x="1711939" y="1306549"/>
+            <a:ext cx="742265" cy="742265"/>
+          </a:xfrm>
+          <a:custGeom>
+            <a:avLst/>
+            <a:gdLst/>
+            <a:ahLst/>
+            <a:cxnLst/>
+            <a:rect r="r" b="b" t="t" l="l"/>
+            <a:pathLst>
+              <a:path h="742265" w="742265">
+                <a:moveTo>
+                  <a:pt x="0" y="0"/>
+                </a:moveTo>
+                <a:lnTo>
+                  <a:pt x="742264" y="0"/>
+                </a:lnTo>
+                <a:lnTo>
+                  <a:pt x="742264" y="742265"/>
+                </a:lnTo>
+                <a:lnTo>
+                  <a:pt x="0" y="742265"/>
+                </a:lnTo>
+                <a:lnTo>
+                  <a:pt x="0" y="0"/>
+                </a:lnTo>
+                <a:close/>
+              </a:path>
+            </a:pathLst>
+          </a:custGeom>
+          <a:blipFill>
+            <a:blip r:embed="rId2">
+              <a:extLst>
+                <a:ext uri="{96DAC541-7B7A-43D3-8B79-37D633B846F1}">
+                  <asvg:svgBlip xmlns:asvg="http://schemas.microsoft.com/office/drawing/2016/SVG/main" r:embed="rId3"/>
+                </a:ext>
+              </a:extLst>
+            </a:blip>
+            <a:stretch>
+              <a:fillRect l="0" t="0" r="0" b="0"/>
+            </a:stretch>
+          </a:blipFill>
+        </p:spPr>
+      </p:sp>
+      <p:sp>
+        <p:nvSpPr>
+          <p:cNvPr name="Freeform 3" id="3"/>
+          <p:cNvSpPr/>
+          <p:nvPr/>
+        </p:nvSpPr>
+        <p:spPr>
+          <a:xfrm flipH="false" flipV="false" rot="0">
+            <a:off x="4111353" y="1495490"/>
+            <a:ext cx="9756040" cy="2447879"/>
+          </a:xfrm>
+          <a:custGeom>
+            <a:avLst/>
+            <a:gdLst/>
+            <a:ahLst/>
+            <a:cxnLst/>
+            <a:rect r="r" b="b" t="t" l="l"/>
+            <a:pathLst>
+              <a:path h="2447879" w="9756040">
+                <a:moveTo>
+                  <a:pt x="0" y="0"/>
+                </a:moveTo>
+                <a:lnTo>
+                  <a:pt x="9756040" y="0"/>
+                </a:lnTo>
+                <a:lnTo>
+                  <a:pt x="9756040" y="2447879"/>
+                </a:lnTo>
+                <a:lnTo>
+                  <a:pt x="0" y="2447879"/>
+                </a:lnTo>
+                <a:lnTo>
+                  <a:pt x="0" y="0"/>
+                </a:lnTo>
+                <a:close/>
+              </a:path>
+            </a:pathLst>
+          </a:custGeom>
+          <a:blipFill>
+            <a:blip r:embed="rId4">
+              <a:extLst>
+                <a:ext uri="{96DAC541-7B7A-43D3-8B79-37D633B846F1}">
+                  <asvg:svgBlip xmlns:asvg="http://schemas.microsoft.com/office/drawing/2016/SVG/main" r:embed="rId5"/>
+                </a:ext>
+              </a:extLst>
+            </a:blip>
+            <a:stretch>
+              <a:fillRect l="0" t="0" r="0" b="0"/>
+            </a:stretch>
+          </a:blipFill>
+        </p:spPr>
+      </p:sp>
+      <p:grpSp>
+        <p:nvGrpSpPr>
+          <p:cNvPr name="Group 4" id="4"/>
+          <p:cNvGrpSpPr/>
+          <p:nvPr/>
+        </p:nvGrpSpPr>
+        <p:grpSpPr>
+          <a:xfrm rot="0">
+            <a:off x="-200474" y="4192382"/>
+            <a:ext cx="18688947" cy="3721654"/>
+            <a:chOff x="0" y="0"/>
+            <a:chExt cx="4922192" cy="980189"/>
+          </a:xfrm>
+        </p:grpSpPr>
+        <p:sp>
+          <p:nvSpPr>
+            <p:cNvPr name="Freeform 5" id="5"/>
+            <p:cNvSpPr/>
+            <p:nvPr/>
+          </p:nvSpPr>
+          <p:spPr>
+            <a:xfrm flipH="false" flipV="false" rot="0">
+              <a:off x="0" y="0"/>
+              <a:ext cx="4922192" cy="980189"/>
+            </a:xfrm>
+            <a:custGeom>
+              <a:avLst/>
+              <a:gdLst/>
+              <a:ahLst/>
+              <a:cxnLst/>
+              <a:rect r="r" b="b" t="t" l="l"/>
+              <a:pathLst>
+                <a:path h="980189" w="4922192">
+                  <a:moveTo>
+                    <a:pt x="0" y="0"/>
+                  </a:moveTo>
+                  <a:lnTo>
+                    <a:pt x="4922192" y="0"/>
+                  </a:lnTo>
+                  <a:lnTo>
+                    <a:pt x="4922192" y="980189"/>
+                  </a:lnTo>
+                  <a:lnTo>
+                    <a:pt x="0" y="980189"/>
+                  </a:lnTo>
+                  <a:close/>
+                </a:path>
+              </a:pathLst>
+            </a:custGeom>
+            <a:gradFill rotWithShape="true">
+              <a:gsLst>
+                <a:gs pos="0">
+                  <a:srgbClr val="131F40">
+                    <a:alpha val="75000"/>
+                  </a:srgbClr>
+                </a:gs>
+                <a:gs pos="100000">
+                  <a:srgbClr val="3D6D81">
+                    <a:alpha val="75000"/>
+                  </a:srgbClr>
+                </a:gs>
+              </a:gsLst>
+              <a:lin ang="0"/>
+            </a:gradFill>
+          </p:spPr>
+        </p:sp>
+        <p:sp>
+          <p:nvSpPr>
+            <p:cNvPr name="TextBox 6" id="6"/>
+            <p:cNvSpPr txBox="true"/>
+            <p:nvPr/>
+          </p:nvSpPr>
+          <p:spPr>
+            <a:xfrm>
+              <a:off x="0" y="28575"/>
+              <a:ext cx="4922192" cy="951614"/>
+            </a:xfrm>
+            <a:prstGeom prst="rect">
+              <a:avLst/>
+            </a:prstGeom>
+          </p:spPr>
+          <p:txBody>
+            <a:bodyPr anchor="ctr" rtlCol="false" tIns="50800" lIns="50800" bIns="50800" rIns="50800"/>
+            <a:lstStyle/>
+            <a:p>
+              <a:pPr algn="ctr">
+                <a:lnSpc>
+                  <a:spcPts val="2181"/>
+                </a:lnSpc>
+              </a:pPr>
+            </a:p>
+          </p:txBody>
+        </p:sp>
+      </p:grpSp>
+      <p:sp>
+        <p:nvSpPr>
+          <p:cNvPr name="TextBox 7" id="7"/>
+          <p:cNvSpPr txBox="true"/>
+          <p:nvPr/>
+        </p:nvSpPr>
+        <p:spPr>
+          <a:xfrm rot="0">
+            <a:off x="5393826" y="2429996"/>
+            <a:ext cx="7500348" cy="645541"/>
+          </a:xfrm>
+          <a:prstGeom prst="rect">
+            <a:avLst/>
+          </a:prstGeom>
+        </p:spPr>
+        <p:txBody>
+          <a:bodyPr anchor="t" rtlCol="false" tIns="0" lIns="0" bIns="0" rIns="0">
+            <a:spAutoFit/>
+          </a:bodyPr>
+          <a:lstStyle/>
+          <a:p>
+            <a:pPr algn="l">
+              <a:lnSpc>
+                <a:spcPts val="4982"/>
+              </a:lnSpc>
+              <a:spcBef>
+                <a:spcPct val="0"/>
+              </a:spcBef>
+            </a:pPr>
+            <a:r>
+              <a:rPr lang="en-US" b="true" sz="4700">
+                <a:solidFill>
+                  <a:srgbClr val="84E3F8"/>
+                </a:solidFill>
+                <a:latin typeface="TT Lakes Neue Bold"/>
+                <a:ea typeface="TT Lakes Neue Bold"/>
+                <a:cs typeface="TT Lakes Neue Bold"/>
+                <a:sym typeface="TT Lakes Neue Bold"/>
+              </a:rPr>
+              <a:t>EXISTING SOLUTIONS</a:t>
+            </a:r>
+          </a:p>
+        </p:txBody>
+      </p:sp>
+      <p:sp>
+        <p:nvSpPr>
+          <p:cNvPr name="TextBox 8" id="8"/>
+          <p:cNvSpPr txBox="true"/>
+          <p:nvPr/>
+        </p:nvSpPr>
+        <p:spPr>
+          <a:xfrm rot="0">
+            <a:off x="16175678" y="1560323"/>
+            <a:ext cx="1418817" cy="263273"/>
+          </a:xfrm>
+          <a:prstGeom prst="rect">
+            <a:avLst/>
+          </a:prstGeom>
+        </p:spPr>
+        <p:txBody>
+          <a:bodyPr anchor="t" rtlCol="false" tIns="0" lIns="0" bIns="0" rIns="0">
+            <a:spAutoFit/>
+          </a:bodyPr>
+          <a:lstStyle/>
+          <a:p>
+            <a:pPr algn="l">
+              <a:lnSpc>
+                <a:spcPts val="2067"/>
+              </a:lnSpc>
+              <a:spcBef>
+                <a:spcPct val="0"/>
+              </a:spcBef>
+            </a:pPr>
+            <a:r>
+              <a:rPr lang="en-US" sz="1950">
+                <a:solidFill>
+                  <a:srgbClr val="FFFFFF"/>
+                </a:solidFill>
+                <a:latin typeface="TT Lakes Neue"/>
+                <a:ea typeface="TT Lakes Neue"/>
+                <a:cs typeface="TT Lakes Neue"/>
+                <a:sym typeface="TT Lakes Neue"/>
+              </a:rPr>
+              <a:t>PAGE 05</a:t>
+            </a:r>
+          </a:p>
+        </p:txBody>
+      </p:sp>
+      <p:sp>
+        <p:nvSpPr>
+          <p:cNvPr name="TextBox 9" id="9"/>
+          <p:cNvSpPr txBox="true"/>
+          <p:nvPr/>
+        </p:nvSpPr>
+        <p:spPr>
+          <a:xfrm rot="0">
+            <a:off x="2877599" y="4829380"/>
+            <a:ext cx="13759471" cy="3763787"/>
+          </a:xfrm>
+          <a:prstGeom prst="rect">
+            <a:avLst/>
+          </a:prstGeom>
+        </p:spPr>
+        <p:txBody>
+          <a:bodyPr anchor="t" rtlCol="false" tIns="0" lIns="0" bIns="0" rIns="0">
+            <a:spAutoFit/>
+          </a:bodyPr>
+          <a:lstStyle/>
+          <a:p>
+            <a:pPr algn="l">
+              <a:lnSpc>
+                <a:spcPts val="3665"/>
+              </a:lnSpc>
+            </a:pPr>
+            <a:r>
+              <a:rPr lang="en-US" sz="3457" b="true">
+                <a:solidFill>
+                  <a:srgbClr val="FFFFFF"/>
+                </a:solidFill>
+                <a:latin typeface="Raleway Bold"/>
+                <a:ea typeface="Raleway Bold"/>
+                <a:cs typeface="Raleway Bold"/>
+                <a:sym typeface="Raleway Bold"/>
+              </a:rPr>
+              <a:t>Khanmigo by Khan Academy (Khan, 2024)</a:t>
+            </a:r>
+          </a:p>
+          <a:p>
+            <a:pPr algn="l">
+              <a:lnSpc>
+                <a:spcPts val="3665"/>
+              </a:lnSpc>
+            </a:pPr>
+          </a:p>
+          <a:p>
+            <a:pPr algn="l" marL="746575" indent="-373287" lvl="1">
+              <a:lnSpc>
+                <a:spcPts val="3665"/>
+              </a:lnSpc>
+              <a:buFont typeface="Arial"/>
+              <a:buChar char="•"/>
+            </a:pPr>
+            <a:r>
+              <a:rPr lang="en-US" b="true" sz="3457">
+                <a:solidFill>
+                  <a:srgbClr val="FFFFFF"/>
+                </a:solidFill>
+                <a:latin typeface="Raleway Bold"/>
+                <a:ea typeface="Raleway Bold"/>
+                <a:cs typeface="Raleway Bold"/>
+                <a:sym typeface="Raleway Bold"/>
+              </a:rPr>
+              <a:t>Creates lesson plans from its own content</a:t>
+            </a:r>
+          </a:p>
+          <a:p>
+            <a:pPr algn="l" marL="746575" indent="-373287" lvl="1">
+              <a:lnSpc>
+                <a:spcPts val="3665"/>
+              </a:lnSpc>
+              <a:buFont typeface="Arial"/>
+              <a:buChar char="•"/>
+            </a:pPr>
+            <a:r>
+              <a:rPr lang="en-US" b="true" sz="3457">
+                <a:solidFill>
+                  <a:srgbClr val="FFFFFF"/>
+                </a:solidFill>
+                <a:latin typeface="Raleway Bold"/>
+                <a:ea typeface="Raleway Bold"/>
+                <a:cs typeface="Raleway Bold"/>
+                <a:sym typeface="Raleway Bold"/>
+              </a:rPr>
+              <a:t>Does not allow for teachers to provide input of specific sources</a:t>
+            </a:r>
+          </a:p>
+          <a:p>
+            <a:pPr algn="l">
+              <a:lnSpc>
+                <a:spcPts val="3665"/>
+              </a:lnSpc>
+            </a:pPr>
+          </a:p>
+          <a:p>
+            <a:pPr algn="l">
+              <a:lnSpc>
+                <a:spcPts val="3665"/>
+              </a:lnSpc>
+            </a:pPr>
+          </a:p>
+          <a:p>
+            <a:pPr algn="l">
+              <a:lnSpc>
+                <a:spcPts val="2181"/>
+              </a:lnSpc>
+            </a:pPr>
+            <a:r>
+              <a:rPr lang="en-US" sz="2058" b="true">
+                <a:solidFill>
+                  <a:srgbClr val="FFFFFF"/>
+                </a:solidFill>
+                <a:latin typeface="Raleway Bold"/>
+                <a:ea typeface="Raleway Bold"/>
+                <a:cs typeface="Raleway Bold"/>
+                <a:sym typeface="Raleway Bold"/>
+              </a:rPr>
+              <a:t>(khanacademy.org/teacher/khanmigo-tools/lesson-plan?platform=KhanAcademy)</a:t>
+            </a:r>
+          </a:p>
+          <a:p>
+            <a:pPr algn="l">
+              <a:lnSpc>
+                <a:spcPts val="2181"/>
+              </a:lnSpc>
+            </a:pPr>
+          </a:p>
+        </p:txBody>
+      </p:sp>
+      <p:sp>
+        <p:nvSpPr>
+          <p:cNvPr name="TextBox 10" id="10"/>
+          <p:cNvSpPr txBox="true"/>
+          <p:nvPr/>
+        </p:nvSpPr>
+        <p:spPr>
+          <a:xfrm rot="0">
+            <a:off x="2692536" y="1431726"/>
+            <a:ext cx="3943940" cy="520448"/>
+          </a:xfrm>
+          <a:prstGeom prst="rect">
+            <a:avLst/>
+          </a:prstGeom>
+        </p:spPr>
+        <p:txBody>
+          <a:bodyPr anchor="t" rtlCol="false" tIns="0" lIns="0" bIns="0" rIns="0">
+            <a:spAutoFit/>
+          </a:bodyPr>
+          <a:lstStyle/>
+          <a:p>
+            <a:pPr algn="l">
+              <a:lnSpc>
+                <a:spcPts val="2067"/>
+              </a:lnSpc>
+            </a:pPr>
+            <a:r>
+              <a:rPr lang="en-US" sz="1950">
+                <a:solidFill>
+                  <a:srgbClr val="FFFFFF"/>
+                </a:solidFill>
+                <a:latin typeface="TT Lakes Neue"/>
+                <a:ea typeface="TT Lakes Neue"/>
+                <a:cs typeface="TT Lakes Neue"/>
+                <a:sym typeface="TT Lakes Neue"/>
+              </a:rPr>
+              <a:t>LEHIGH UNIVERSITY</a:t>
+            </a:r>
+          </a:p>
+          <a:p>
+            <a:pPr algn="l">
+              <a:lnSpc>
+                <a:spcPts val="2067"/>
+              </a:lnSpc>
+              <a:spcBef>
+                <a:spcPct val="0"/>
+              </a:spcBef>
+            </a:pPr>
+            <a:r>
+              <a:rPr lang="en-US" sz="1950">
+                <a:solidFill>
+                  <a:srgbClr val="FFFFFF"/>
+                </a:solidFill>
+                <a:latin typeface="TT Lakes Neue"/>
+                <a:ea typeface="TT Lakes Neue"/>
+                <a:cs typeface="TT Lakes Neue"/>
+                <a:sym typeface="TT Lakes Neue"/>
+              </a:rPr>
+              <a:t>DATA SCIENCE</a:t>
+            </a:r>
+          </a:p>
+        </p:txBody>
+      </p:sp>
+    </p:spTree>
+  </p:cSld>
+  <p:clrMapOvr>
+    <a:masterClrMapping/>
+  </p:clrMapOvr>
+</p:sld>
+</file>
+
+<file path=ppt/slides/slide6.xml><?xml version="1.0" encoding="utf-8"?>
+<p:sld xmlns:p="http://schemas.openxmlformats.org/presentationml/2006/main" xmlns:a="http://schemas.openxmlformats.org/drawingml/2006/main" xmlns:r="http://schemas.openxmlformats.org/officeDocument/2006/relationships">
+  <p:cSld>
+    <p:bg>
+      <p:bgPr>
+        <a:gradFill rotWithShape="true">
+          <a:gsLst>
+            <a:gs pos="0">
+              <a:srgbClr val="131F40">
+                <a:alpha val="100000"/>
+              </a:srgbClr>
+            </a:gs>
+            <a:gs pos="100000">
+              <a:srgbClr val="3D6D81">
+                <a:alpha val="100000"/>
+              </a:srgbClr>
+            </a:gs>
+          </a:gsLst>
+          <a:lin ang="5400000"/>
+        </a:gradFill>
+      </p:bgPr>
+    </p:bg>
+    <p:spTree>
+      <p:nvGrpSpPr>
+        <p:cNvPr id="1" name=""/>
+        <p:cNvGrpSpPr/>
+        <p:nvPr/>
+      </p:nvGrpSpPr>
+      <p:grpSpPr>
+        <a:xfrm>
+          <a:off x="0" y="0"/>
+          <a:ext cx="0" cy="0"/>
+          <a:chOff x="0" y="0"/>
+          <a:chExt cx="0" cy="0"/>
+        </a:xfrm>
+      </p:grpSpPr>
       <p:grpSp>
         <p:nvGrpSpPr>
           <p:cNvPr name="Group 2" id="2"/>
@@ -12544,10 +12787,10 @@
         </p:nvGrpSpPr>
         <p:grpSpPr>
           <a:xfrm rot="0">
-            <a:off x="9256123" y="624644"/>
-            <a:ext cx="8384422" cy="8776455"/>
+            <a:off x="9256123" y="1267581"/>
+            <a:ext cx="8384422" cy="7490580"/>
             <a:chOff x="0" y="0"/>
-            <a:chExt cx="11179230" cy="11701940"/>
+            <a:chExt cx="11179230" cy="9987440"/>
           </a:xfrm>
         </p:grpSpPr>
         <p:sp>
@@ -12600,7 +12843,7 @@
           <p:spPr>
             <a:xfrm rot="0">
               <a:off x="161667" y="2582914"/>
-              <a:ext cx="10356836" cy="9119027"/>
+              <a:ext cx="10356836" cy="7404527"/>
             </a:xfrm>
             <a:prstGeom prst="rect">
               <a:avLst/>
@@ -12681,7 +12924,7 @@
                   <a:cs typeface="TT Lakes Neue"/>
                   <a:sym typeface="TT Lakes Neue"/>
                 </a:rPr>
-                <a:t>: EXTRACT IMAGES, TEXT, AND TABLEAU FROM WEBSITE</a:t>
+                <a:t>: EXTRACT IMAGES, TEXT, AND TABLES FROM WEBSITE</a:t>
               </a:r>
             </a:p>
             <a:p>
@@ -12721,7 +12964,7 @@
                   <a:cs typeface="TT Lakes Neue"/>
                   <a:sym typeface="TT Lakes Neue"/>
                 </a:rPr>
-                <a:t> : EXTRACT TEXT FROM PDFS</a:t>
+                <a:t>: EXTRACT TEXT FROM PDFS</a:t>
               </a:r>
             </a:p>
             <a:p>
@@ -12762,46 +13005,6 @@
                   <a:sym typeface="TT Lakes Neue"/>
                 </a:rPr>
                 <a:t>: EXTRACT IMAGES AND TABLES FROM PDFS</a:t>
-              </a:r>
-            </a:p>
-            <a:p>
-              <a:pPr algn="l">
-                <a:lnSpc>
-                  <a:spcPts val="3379"/>
-                </a:lnSpc>
-              </a:pPr>
-            </a:p>
-            <a:p>
-              <a:pPr algn="l" marL="561298" indent="-280649" lvl="1">
-                <a:lnSpc>
-                  <a:spcPts val="3379"/>
-                </a:lnSpc>
-                <a:buFont typeface="Arial"/>
-                <a:buChar char="•"/>
-              </a:pPr>
-              <a:r>
-                <a:rPr lang="en-US" b="true" sz="2599">
-                  <a:solidFill>
-                    <a:srgbClr val="FFFFFF"/>
-                  </a:solidFill>
-                  <a:latin typeface="TT Lakes Neue Bold"/>
-                  <a:ea typeface="TT Lakes Neue Bold"/>
-                  <a:cs typeface="TT Lakes Neue Bold"/>
-                  <a:sym typeface="TT Lakes Neue Bold"/>
-                </a:rPr>
-                <a:t>BEAUTIFULSOUP</a:t>
-              </a:r>
-              <a:r>
-                <a:rPr lang="en-US" sz="2599">
-                  <a:solidFill>
-                    <a:srgbClr val="FFFFFF"/>
-                  </a:solidFill>
-                  <a:latin typeface="TT Lakes Neue"/>
-                  <a:ea typeface="TT Lakes Neue"/>
-                  <a:cs typeface="TT Lakes Neue"/>
-                  <a:sym typeface="TT Lakes Neue"/>
-                </a:rPr>
-                <a:t>: EXTRACT TEXT, IMAGES, AND TABLEAU FROM WEBPAGES</a:t>
               </a:r>
             </a:p>
             <a:p>
@@ -12910,184 +13113,6 @@
                 <a:cs typeface="TT Lakes Neue"/>
                 <a:sym typeface="TT Lakes Neue"/>
               </a:rPr>
-              <a:t>PAGE 05</a:t>
-            </a:r>
-          </a:p>
-        </p:txBody>
-      </p:sp>
-    </p:spTree>
-  </p:cSld>
-  <p:clrMapOvr>
-    <a:masterClrMapping/>
-  </p:clrMapOvr>
-</p:sld>
-</file>
-
-<file path=ppt/slides/slide6.xml><?xml version="1.0" encoding="utf-8"?>
-<p:sld xmlns:p="http://schemas.openxmlformats.org/presentationml/2006/main" xmlns:a="http://schemas.openxmlformats.org/drawingml/2006/main" xmlns:r="http://schemas.openxmlformats.org/officeDocument/2006/relationships">
-  <p:cSld>
-    <p:bg>
-      <p:bgPr>
-        <a:gradFill rotWithShape="true">
-          <a:gsLst>
-            <a:gs pos="0">
-              <a:srgbClr val="131F40">
-                <a:alpha val="100000"/>
-              </a:srgbClr>
-            </a:gs>
-            <a:gs pos="100000">
-              <a:srgbClr val="3D6D81">
-                <a:alpha val="100000"/>
-              </a:srgbClr>
-            </a:gs>
-          </a:gsLst>
-          <a:lin ang="5400000"/>
-        </a:gradFill>
-      </p:bgPr>
-    </p:bg>
-    <p:spTree>
-      <p:nvGrpSpPr>
-        <p:cNvPr id="1" name=""/>
-        <p:cNvGrpSpPr/>
-        <p:nvPr/>
-      </p:nvGrpSpPr>
-      <p:grpSpPr>
-        <a:xfrm>
-          <a:off x="0" y="0"/>
-          <a:ext cx="0" cy="0"/>
-          <a:chOff x="0" y="0"/>
-          <a:chExt cx="0" cy="0"/>
-        </a:xfrm>
-      </p:grpSpPr>
-      <p:sp>
-        <p:nvSpPr>
-          <p:cNvPr name="Freeform 2" id="2"/>
-          <p:cNvSpPr/>
-          <p:nvPr/>
-        </p:nvSpPr>
-        <p:spPr>
-          <a:xfrm flipH="false" flipV="false" rot="0">
-            <a:off x="1028700" y="2247265"/>
-            <a:ext cx="16732871" cy="7718037"/>
-          </a:xfrm>
-          <a:custGeom>
-            <a:avLst/>
-            <a:gdLst/>
-            <a:ahLst/>
-            <a:cxnLst/>
-            <a:rect r="r" b="b" t="t" l="l"/>
-            <a:pathLst>
-              <a:path h="7718037" w="16732871">
-                <a:moveTo>
-                  <a:pt x="0" y="0"/>
-                </a:moveTo>
-                <a:lnTo>
-                  <a:pt x="16732871" y="0"/>
-                </a:lnTo>
-                <a:lnTo>
-                  <a:pt x="16732871" y="7718037"/>
-                </a:lnTo>
-                <a:lnTo>
-                  <a:pt x="0" y="7718037"/>
-                </a:lnTo>
-                <a:lnTo>
-                  <a:pt x="0" y="0"/>
-                </a:lnTo>
-                <a:close/>
-              </a:path>
-            </a:pathLst>
-          </a:custGeom>
-          <a:blipFill>
-            <a:blip r:embed="rId2"/>
-            <a:stretch>
-              <a:fillRect l="0" t="0" r="0" b="0"/>
-            </a:stretch>
-          </a:blipFill>
-        </p:spPr>
-      </p:sp>
-      <p:sp>
-        <p:nvSpPr>
-          <p:cNvPr name="TextBox 3" id="3"/>
-          <p:cNvSpPr txBox="true"/>
-          <p:nvPr/>
-        </p:nvSpPr>
-        <p:spPr>
-          <a:xfrm rot="0">
-            <a:off x="556209" y="1133475"/>
-            <a:ext cx="12828569" cy="1113790"/>
-          </a:xfrm>
-          <a:prstGeom prst="rect">
-            <a:avLst/>
-          </a:prstGeom>
-        </p:spPr>
-        <p:txBody>
-          <a:bodyPr anchor="t" rtlCol="false" tIns="0" lIns="0" bIns="0" rIns="0">
-            <a:spAutoFit/>
-          </a:bodyPr>
-          <a:lstStyle/>
-          <a:p>
-            <a:pPr algn="ctr">
-              <a:lnSpc>
-                <a:spcPts val="8480"/>
-              </a:lnSpc>
-              <a:spcBef>
-                <a:spcPct val="0"/>
-              </a:spcBef>
-            </a:pPr>
-            <a:r>
-              <a:rPr lang="en-US" b="true" sz="8000">
-                <a:solidFill>
-                  <a:srgbClr val="FFFFFF"/>
-                </a:solidFill>
-                <a:latin typeface="TT Lakes Neue Bold"/>
-                <a:ea typeface="TT Lakes Neue Bold"/>
-                <a:cs typeface="TT Lakes Neue Bold"/>
-                <a:sym typeface="TT Lakes Neue Bold"/>
-              </a:rPr>
-              <a:t>PROCESS FLOWCHART</a:t>
-            </a:r>
-          </a:p>
-        </p:txBody>
-      </p:sp>
-      <p:sp>
-        <p:nvSpPr>
-          <p:cNvPr name="TextBox 4" id="4"/>
-          <p:cNvSpPr txBox="true"/>
-          <p:nvPr/>
-        </p:nvSpPr>
-        <p:spPr>
-          <a:xfrm rot="0">
-            <a:off x="16175678" y="1560323"/>
-            <a:ext cx="1418817" cy="263292"/>
-          </a:xfrm>
-          <a:prstGeom prst="rect">
-            <a:avLst/>
-          </a:prstGeom>
-        </p:spPr>
-        <p:txBody>
-          <a:bodyPr anchor="t" rtlCol="false" tIns="0" lIns="0" bIns="0" rIns="0">
-            <a:spAutoFit/>
-          </a:bodyPr>
-          <a:lstStyle/>
-          <a:p>
-            <a:pPr algn="l">
-              <a:lnSpc>
-                <a:spcPts val="2067"/>
-              </a:lnSpc>
-              <a:spcBef>
-                <a:spcPct val="0"/>
-              </a:spcBef>
-            </a:pPr>
-            <a:r>
-              <a:rPr lang="en-US" sz="1950">
-                <a:solidFill>
-                  <a:srgbClr val="FFFFFF"/>
-                </a:solidFill>
-                <a:latin typeface="TT Lakes Neue"/>
-                <a:ea typeface="TT Lakes Neue"/>
-                <a:cs typeface="TT Lakes Neue"/>
-                <a:sym typeface="TT Lakes Neue"/>
-              </a:rPr>
               <a:t>PAGE 06</a:t>
             </a:r>
           </a:p>
@@ -13145,8 +13170,8 @@
         </p:nvSpPr>
         <p:spPr>
           <a:xfrm flipH="false" flipV="false" rot="0">
-            <a:off x="2386213" y="2247265"/>
-            <a:ext cx="13515574" cy="7703877"/>
+            <a:off x="1028700" y="2247265"/>
+            <a:ext cx="16732871" cy="7718037"/>
           </a:xfrm>
           <a:custGeom>
             <a:avLst/>
@@ -13155,18 +13180,18 @@
             <a:cxnLst/>
             <a:rect r="r" b="b" t="t" l="l"/>
             <a:pathLst>
-              <a:path h="7703877" w="13515574">
+              <a:path h="7718037" w="16732871">
                 <a:moveTo>
                   <a:pt x="0" y="0"/>
                 </a:moveTo>
                 <a:lnTo>
-                  <a:pt x="13515574" y="0"/>
-                </a:lnTo>
-                <a:lnTo>
-                  <a:pt x="13515574" y="7703878"/>
-                </a:lnTo>
-                <a:lnTo>
-                  <a:pt x="0" y="7703878"/>
+                  <a:pt x="16732871" y="0"/>
+                </a:lnTo>
+                <a:lnTo>
+                  <a:pt x="16732871" y="7718037"/>
+                </a:lnTo>
+                <a:lnTo>
+                  <a:pt x="0" y="7718037"/>
                 </a:lnTo>
                 <a:lnTo>
                   <a:pt x="0" y="0"/>
@@ -13192,7 +13217,7 @@
         <p:spPr>
           <a:xfrm rot="0">
             <a:off x="556209" y="1133475"/>
-            <a:ext cx="15659973" cy="1113790"/>
+            <a:ext cx="12828569" cy="1113790"/>
           </a:xfrm>
           <a:prstGeom prst="rect">
             <a:avLst/>
@@ -13222,7 +13247,7 @@
                 <a:cs typeface="TT Lakes Neue Bold"/>
                 <a:sym typeface="TT Lakes Neue Bold"/>
               </a:rPr>
-              <a:t>DOCUMENT PROCESSING</a:t>
+              <a:t>PROCESS FLOWCHART</a:t>
             </a:r>
           </a:p>
         </p:txBody>
@@ -13280,6 +13305,184 @@
 </file>
 
 <file path=ppt/slides/slide8.xml><?xml version="1.0" encoding="utf-8"?>
+<p:sld xmlns:p="http://schemas.openxmlformats.org/presentationml/2006/main" xmlns:a="http://schemas.openxmlformats.org/drawingml/2006/main" xmlns:r="http://schemas.openxmlformats.org/officeDocument/2006/relationships">
+  <p:cSld>
+    <p:bg>
+      <p:bgPr>
+        <a:gradFill rotWithShape="true">
+          <a:gsLst>
+            <a:gs pos="0">
+              <a:srgbClr val="131F40">
+                <a:alpha val="100000"/>
+              </a:srgbClr>
+            </a:gs>
+            <a:gs pos="100000">
+              <a:srgbClr val="3D6D81">
+                <a:alpha val="100000"/>
+              </a:srgbClr>
+            </a:gs>
+          </a:gsLst>
+          <a:lin ang="5400000"/>
+        </a:gradFill>
+      </p:bgPr>
+    </p:bg>
+    <p:spTree>
+      <p:nvGrpSpPr>
+        <p:cNvPr id="1" name=""/>
+        <p:cNvGrpSpPr/>
+        <p:nvPr/>
+      </p:nvGrpSpPr>
+      <p:grpSpPr>
+        <a:xfrm>
+          <a:off x="0" y="0"/>
+          <a:ext cx="0" cy="0"/>
+          <a:chOff x="0" y="0"/>
+          <a:chExt cx="0" cy="0"/>
+        </a:xfrm>
+      </p:grpSpPr>
+      <p:sp>
+        <p:nvSpPr>
+          <p:cNvPr name="Freeform 2" id="2"/>
+          <p:cNvSpPr/>
+          <p:nvPr/>
+        </p:nvSpPr>
+        <p:spPr>
+          <a:xfrm flipH="false" flipV="false" rot="0">
+            <a:off x="2386213" y="2247265"/>
+            <a:ext cx="13515574" cy="7703877"/>
+          </a:xfrm>
+          <a:custGeom>
+            <a:avLst/>
+            <a:gdLst/>
+            <a:ahLst/>
+            <a:cxnLst/>
+            <a:rect r="r" b="b" t="t" l="l"/>
+            <a:pathLst>
+              <a:path h="7703877" w="13515574">
+                <a:moveTo>
+                  <a:pt x="0" y="0"/>
+                </a:moveTo>
+                <a:lnTo>
+                  <a:pt x="13515574" y="0"/>
+                </a:lnTo>
+                <a:lnTo>
+                  <a:pt x="13515574" y="7703878"/>
+                </a:lnTo>
+                <a:lnTo>
+                  <a:pt x="0" y="7703878"/>
+                </a:lnTo>
+                <a:lnTo>
+                  <a:pt x="0" y="0"/>
+                </a:lnTo>
+                <a:close/>
+              </a:path>
+            </a:pathLst>
+          </a:custGeom>
+          <a:blipFill>
+            <a:blip r:embed="rId2"/>
+            <a:stretch>
+              <a:fillRect l="0" t="0" r="0" b="0"/>
+            </a:stretch>
+          </a:blipFill>
+        </p:spPr>
+      </p:sp>
+      <p:sp>
+        <p:nvSpPr>
+          <p:cNvPr name="TextBox 3" id="3"/>
+          <p:cNvSpPr txBox="true"/>
+          <p:nvPr/>
+        </p:nvSpPr>
+        <p:spPr>
+          <a:xfrm rot="0">
+            <a:off x="556209" y="1133475"/>
+            <a:ext cx="15659973" cy="1113790"/>
+          </a:xfrm>
+          <a:prstGeom prst="rect">
+            <a:avLst/>
+          </a:prstGeom>
+        </p:spPr>
+        <p:txBody>
+          <a:bodyPr anchor="t" rtlCol="false" tIns="0" lIns="0" bIns="0" rIns="0">
+            <a:spAutoFit/>
+          </a:bodyPr>
+          <a:lstStyle/>
+          <a:p>
+            <a:pPr algn="ctr">
+              <a:lnSpc>
+                <a:spcPts val="8480"/>
+              </a:lnSpc>
+              <a:spcBef>
+                <a:spcPct val="0"/>
+              </a:spcBef>
+            </a:pPr>
+            <a:r>
+              <a:rPr lang="en-US" b="true" sz="8000">
+                <a:solidFill>
+                  <a:srgbClr val="FFFFFF"/>
+                </a:solidFill>
+                <a:latin typeface="TT Lakes Neue Bold"/>
+                <a:ea typeface="TT Lakes Neue Bold"/>
+                <a:cs typeface="TT Lakes Neue Bold"/>
+                <a:sym typeface="TT Lakes Neue Bold"/>
+              </a:rPr>
+              <a:t>DOCUMENT PROCESSING</a:t>
+            </a:r>
+          </a:p>
+        </p:txBody>
+      </p:sp>
+      <p:sp>
+        <p:nvSpPr>
+          <p:cNvPr name="TextBox 4" id="4"/>
+          <p:cNvSpPr txBox="true"/>
+          <p:nvPr/>
+        </p:nvSpPr>
+        <p:spPr>
+          <a:xfrm rot="0">
+            <a:off x="16175678" y="1560323"/>
+            <a:ext cx="1418817" cy="263273"/>
+          </a:xfrm>
+          <a:prstGeom prst="rect">
+            <a:avLst/>
+          </a:prstGeom>
+        </p:spPr>
+        <p:txBody>
+          <a:bodyPr anchor="t" rtlCol="false" tIns="0" lIns="0" bIns="0" rIns="0">
+            <a:spAutoFit/>
+          </a:bodyPr>
+          <a:lstStyle/>
+          <a:p>
+            <a:pPr algn="l">
+              <a:lnSpc>
+                <a:spcPts val="2067"/>
+              </a:lnSpc>
+              <a:spcBef>
+                <a:spcPct val="0"/>
+              </a:spcBef>
+            </a:pPr>
+            <a:r>
+              <a:rPr lang="en-US" sz="1950">
+                <a:solidFill>
+                  <a:srgbClr val="FFFFFF"/>
+                </a:solidFill>
+                <a:latin typeface="TT Lakes Neue"/>
+                <a:ea typeface="TT Lakes Neue"/>
+                <a:cs typeface="TT Lakes Neue"/>
+                <a:sym typeface="TT Lakes Neue"/>
+              </a:rPr>
+              <a:t>PAGE 08</a:t>
+            </a:r>
+          </a:p>
+        </p:txBody>
+      </p:sp>
+    </p:spTree>
+  </p:cSld>
+  <p:clrMapOvr>
+    <a:masterClrMapping/>
+  </p:clrMapOvr>
+</p:sld>
+</file>
+
+<file path=ppt/slides/slide9.xml><?xml version="1.0" encoding="utf-8"?>
 <p:sld xmlns:p="http://schemas.openxmlformats.org/presentationml/2006/main" xmlns:a="http://schemas.openxmlformats.org/drawingml/2006/main" xmlns:r="http://schemas.openxmlformats.org/officeDocument/2006/relationships">
   <p:cSld>
     <p:bg>
@@ -13521,8 +13724,8 @@
         </p:nvSpPr>
         <p:spPr>
           <a:xfrm flipH="false" flipV="false" rot="0">
-            <a:off x="2083071" y="4470922"/>
-            <a:ext cx="15397153" cy="5158046"/>
+            <a:off x="2802846" y="4624454"/>
+            <a:ext cx="12682308" cy="4850983"/>
           </a:xfrm>
           <a:custGeom>
             <a:avLst/>
@@ -13531,18 +13734,18 @@
             <a:cxnLst/>
             <a:rect r="r" b="b" t="t" l="l"/>
             <a:pathLst>
-              <a:path h="5158046" w="15397153">
+              <a:path h="4850983" w="12682308">
                 <a:moveTo>
                   <a:pt x="0" y="0"/>
                 </a:moveTo>
                 <a:lnTo>
-                  <a:pt x="15397153" y="0"/>
-                </a:lnTo>
-                <a:lnTo>
-                  <a:pt x="15397153" y="5158047"/>
-                </a:lnTo>
-                <a:lnTo>
-                  <a:pt x="0" y="5158047"/>
+                  <a:pt x="12682308" y="0"/>
+                </a:lnTo>
+                <a:lnTo>
+                  <a:pt x="12682308" y="4850983"/>
+                </a:lnTo>
+                <a:lnTo>
+                  <a:pt x="0" y="4850983"/>
                 </a:lnTo>
                 <a:lnTo>
                   <a:pt x="0" y="0"/>
@@ -13686,7 +13889,7 @@
                 <a:cs typeface="TT Lakes Neue"/>
                 <a:sym typeface="TT Lakes Neue"/>
               </a:rPr>
-              <a:t>PAGE 08</a:t>
+              <a:t>PAGE 09</a:t>
             </a:r>
           </a:p>
         </p:txBody>
@@ -13694,527 +13897,6 @@
       <p:sp>
         <p:nvSpPr>
           <p:cNvPr name="TextBox 11" id="11"/>
-          <p:cNvSpPr txBox="true"/>
-          <p:nvPr/>
-        </p:nvSpPr>
-        <p:spPr>
-          <a:xfrm rot="0">
-            <a:off x="2692536" y="1431726"/>
-            <a:ext cx="3943940" cy="520448"/>
-          </a:xfrm>
-          <a:prstGeom prst="rect">
-            <a:avLst/>
-          </a:prstGeom>
-        </p:spPr>
-        <p:txBody>
-          <a:bodyPr anchor="t" rtlCol="false" tIns="0" lIns="0" bIns="0" rIns="0">
-            <a:spAutoFit/>
-          </a:bodyPr>
-          <a:lstStyle/>
-          <a:p>
-            <a:pPr algn="l">
-              <a:lnSpc>
-                <a:spcPts val="2067"/>
-              </a:lnSpc>
-            </a:pPr>
-            <a:r>
-              <a:rPr lang="en-US" sz="1950">
-                <a:solidFill>
-                  <a:srgbClr val="FFFFFF"/>
-                </a:solidFill>
-                <a:latin typeface="TT Lakes Neue"/>
-                <a:ea typeface="TT Lakes Neue"/>
-                <a:cs typeface="TT Lakes Neue"/>
-                <a:sym typeface="TT Lakes Neue"/>
-              </a:rPr>
-              <a:t>LEHIGH UNIVERSITY</a:t>
-            </a:r>
-          </a:p>
-          <a:p>
-            <a:pPr algn="l">
-              <a:lnSpc>
-                <a:spcPts val="2067"/>
-              </a:lnSpc>
-              <a:spcBef>
-                <a:spcPct val="0"/>
-              </a:spcBef>
-            </a:pPr>
-            <a:r>
-              <a:rPr lang="en-US" sz="1950">
-                <a:solidFill>
-                  <a:srgbClr val="FFFFFF"/>
-                </a:solidFill>
-                <a:latin typeface="TT Lakes Neue"/>
-                <a:ea typeface="TT Lakes Neue"/>
-                <a:cs typeface="TT Lakes Neue"/>
-                <a:sym typeface="TT Lakes Neue"/>
-              </a:rPr>
-              <a:t>DATA SCIENCE</a:t>
-            </a:r>
-          </a:p>
-        </p:txBody>
-      </p:sp>
-    </p:spTree>
-  </p:cSld>
-  <p:clrMapOvr>
-    <a:masterClrMapping/>
-  </p:clrMapOvr>
-</p:sld>
-</file>
-
-<file path=ppt/slides/slide9.xml><?xml version="1.0" encoding="utf-8"?>
-<p:sld xmlns:p="http://schemas.openxmlformats.org/presentationml/2006/main" xmlns:a="http://schemas.openxmlformats.org/drawingml/2006/main" xmlns:r="http://schemas.openxmlformats.org/officeDocument/2006/relationships">
-  <p:cSld>
-    <p:bg>
-      <p:bgPr>
-        <a:gradFill rotWithShape="true">
-          <a:gsLst>
-            <a:gs pos="0">
-              <a:srgbClr val="131F40">
-                <a:alpha val="100000"/>
-              </a:srgbClr>
-            </a:gs>
-            <a:gs pos="100000">
-              <a:srgbClr val="3D6D81">
-                <a:alpha val="100000"/>
-              </a:srgbClr>
-            </a:gs>
-          </a:gsLst>
-          <a:lin ang="5400000"/>
-        </a:gradFill>
-      </p:bgPr>
-    </p:bg>
-    <p:spTree>
-      <p:nvGrpSpPr>
-        <p:cNvPr id="1" name=""/>
-        <p:cNvGrpSpPr/>
-        <p:nvPr/>
-      </p:nvGrpSpPr>
-      <p:grpSpPr>
-        <a:xfrm>
-          <a:off x="0" y="0"/>
-          <a:ext cx="0" cy="0"/>
-          <a:chOff x="0" y="0"/>
-          <a:chExt cx="0" cy="0"/>
-        </a:xfrm>
-      </p:grpSpPr>
-      <p:sp>
-        <p:nvSpPr>
-          <p:cNvPr name="Freeform 2" id="2"/>
-          <p:cNvSpPr/>
-          <p:nvPr/>
-        </p:nvSpPr>
-        <p:spPr>
-          <a:xfrm flipH="false" flipV="false" rot="0">
-            <a:off x="1711939" y="1306549"/>
-            <a:ext cx="742265" cy="742265"/>
-          </a:xfrm>
-          <a:custGeom>
-            <a:avLst/>
-            <a:gdLst/>
-            <a:ahLst/>
-            <a:cxnLst/>
-            <a:rect r="r" b="b" t="t" l="l"/>
-            <a:pathLst>
-              <a:path h="742265" w="742265">
-                <a:moveTo>
-                  <a:pt x="0" y="0"/>
-                </a:moveTo>
-                <a:lnTo>
-                  <a:pt x="742264" y="0"/>
-                </a:lnTo>
-                <a:lnTo>
-                  <a:pt x="742264" y="742265"/>
-                </a:lnTo>
-                <a:lnTo>
-                  <a:pt x="0" y="742265"/>
-                </a:lnTo>
-                <a:lnTo>
-                  <a:pt x="0" y="0"/>
-                </a:lnTo>
-                <a:close/>
-              </a:path>
-            </a:pathLst>
-          </a:custGeom>
-          <a:blipFill>
-            <a:blip r:embed="rId2">
-              <a:extLst>
-                <a:ext uri="{96DAC541-7B7A-43D3-8B79-37D633B846F1}">
-                  <asvg:svgBlip xmlns:asvg="http://schemas.microsoft.com/office/drawing/2016/SVG/main" r:embed="rId3"/>
-                </a:ext>
-              </a:extLst>
-            </a:blip>
-            <a:stretch>
-              <a:fillRect l="0" t="0" r="0" b="0"/>
-            </a:stretch>
-          </a:blipFill>
-        </p:spPr>
-      </p:sp>
-      <p:grpSp>
-        <p:nvGrpSpPr>
-          <p:cNvPr name="Group 3" id="3"/>
-          <p:cNvGrpSpPr/>
-          <p:nvPr/>
-        </p:nvGrpSpPr>
-        <p:grpSpPr>
-          <a:xfrm rot="0">
-            <a:off x="8726356" y="-1898039"/>
-            <a:ext cx="9981859" cy="13795182"/>
-            <a:chOff x="0" y="0"/>
-            <a:chExt cx="2628967" cy="3633299"/>
-          </a:xfrm>
-        </p:grpSpPr>
-        <p:sp>
-          <p:nvSpPr>
-            <p:cNvPr name="Freeform 4" id="4"/>
-            <p:cNvSpPr/>
-            <p:nvPr/>
-          </p:nvSpPr>
-          <p:spPr>
-            <a:xfrm flipH="false" flipV="false" rot="0">
-              <a:off x="0" y="0"/>
-              <a:ext cx="2628967" cy="3633299"/>
-            </a:xfrm>
-            <a:custGeom>
-              <a:avLst/>
-              <a:gdLst/>
-              <a:ahLst/>
-              <a:cxnLst/>
-              <a:rect r="r" b="b" t="t" l="l"/>
-              <a:pathLst>
-                <a:path h="3633299" w="2628967">
-                  <a:moveTo>
-                    <a:pt x="0" y="0"/>
-                  </a:moveTo>
-                  <a:lnTo>
-                    <a:pt x="2628967" y="0"/>
-                  </a:lnTo>
-                  <a:lnTo>
-                    <a:pt x="2628967" y="3633299"/>
-                  </a:lnTo>
-                  <a:lnTo>
-                    <a:pt x="0" y="3633299"/>
-                  </a:lnTo>
-                  <a:close/>
-                </a:path>
-              </a:pathLst>
-            </a:custGeom>
-            <a:gradFill rotWithShape="true">
-              <a:gsLst>
-                <a:gs pos="0">
-                  <a:srgbClr val="131F40">
-                    <a:alpha val="75000"/>
-                  </a:srgbClr>
-                </a:gs>
-                <a:gs pos="100000">
-                  <a:srgbClr val="3D6D81">
-                    <a:alpha val="75000"/>
-                  </a:srgbClr>
-                </a:gs>
-              </a:gsLst>
-              <a:lin ang="0"/>
-            </a:gradFill>
-          </p:spPr>
-        </p:sp>
-        <p:sp>
-          <p:nvSpPr>
-            <p:cNvPr name="TextBox 5" id="5"/>
-            <p:cNvSpPr txBox="true"/>
-            <p:nvPr/>
-          </p:nvSpPr>
-          <p:spPr>
-            <a:xfrm>
-              <a:off x="0" y="28575"/>
-              <a:ext cx="2628967" cy="3604724"/>
-            </a:xfrm>
-            <a:prstGeom prst="rect">
-              <a:avLst/>
-            </a:prstGeom>
-          </p:spPr>
-          <p:txBody>
-            <a:bodyPr anchor="ctr" rtlCol="false" tIns="50800" lIns="50800" bIns="50800" rIns="50800"/>
-            <a:lstStyle/>
-            <a:p>
-              <a:pPr algn="ctr">
-                <a:lnSpc>
-                  <a:spcPts val="2181"/>
-                </a:lnSpc>
-              </a:pPr>
-            </a:p>
-          </p:txBody>
-        </p:sp>
-      </p:grpSp>
-      <p:sp>
-        <p:nvSpPr>
-          <p:cNvPr name="Freeform 6" id="6"/>
-          <p:cNvSpPr/>
-          <p:nvPr/>
-        </p:nvSpPr>
-        <p:spPr>
-          <a:xfrm flipH="false" flipV="false" rot="-5400000">
-            <a:off x="1300272" y="3327963"/>
-            <a:ext cx="7421720" cy="5573037"/>
-          </a:xfrm>
-          <a:custGeom>
-            <a:avLst/>
-            <a:gdLst/>
-            <a:ahLst/>
-            <a:cxnLst/>
-            <a:rect r="r" b="b" t="t" l="l"/>
-            <a:pathLst>
-              <a:path h="5573037" w="7421720">
-                <a:moveTo>
-                  <a:pt x="0" y="0"/>
-                </a:moveTo>
-                <a:lnTo>
-                  <a:pt x="7421719" y="0"/>
-                </a:lnTo>
-                <a:lnTo>
-                  <a:pt x="7421719" y="5573036"/>
-                </a:lnTo>
-                <a:lnTo>
-                  <a:pt x="0" y="5573036"/>
-                </a:lnTo>
-                <a:lnTo>
-                  <a:pt x="0" y="0"/>
-                </a:lnTo>
-                <a:close/>
-              </a:path>
-            </a:pathLst>
-          </a:custGeom>
-          <a:blipFill>
-            <a:blip r:embed="rId4">
-              <a:extLst>
-                <a:ext uri="{96DAC541-7B7A-43D3-8B79-37D633B846F1}">
-                  <asvg:svgBlip xmlns:asvg="http://schemas.microsoft.com/office/drawing/2016/SVG/main" r:embed="rId5"/>
-                </a:ext>
-              </a:extLst>
-            </a:blip>
-            <a:stretch>
-              <a:fillRect l="0" t="0" r="0" b="0"/>
-            </a:stretch>
-          </a:blipFill>
-        </p:spPr>
-      </p:sp>
-      <p:grpSp>
-        <p:nvGrpSpPr>
-          <p:cNvPr name="Group 7" id="7"/>
-          <p:cNvGrpSpPr/>
-          <p:nvPr/>
-        </p:nvGrpSpPr>
-        <p:grpSpPr>
-          <a:xfrm rot="0">
-            <a:off x="2925279" y="3122331"/>
-            <a:ext cx="4261262" cy="6013018"/>
-            <a:chOff x="0" y="0"/>
-            <a:chExt cx="660181" cy="931574"/>
-          </a:xfrm>
-        </p:grpSpPr>
-        <p:sp>
-          <p:nvSpPr>
-            <p:cNvPr name="Freeform 8" id="8"/>
-            <p:cNvSpPr/>
-            <p:nvPr/>
-          </p:nvSpPr>
-          <p:spPr>
-            <a:xfrm flipH="false" flipV="false" rot="0">
-              <a:off x="0" y="0"/>
-              <a:ext cx="660181" cy="931574"/>
-            </a:xfrm>
-            <a:custGeom>
-              <a:avLst/>
-              <a:gdLst/>
-              <a:ahLst/>
-              <a:cxnLst/>
-              <a:rect r="r" b="b" t="t" l="l"/>
-              <a:pathLst>
-                <a:path h="931574" w="660181">
-                  <a:moveTo>
-                    <a:pt x="0" y="0"/>
-                  </a:moveTo>
-                  <a:lnTo>
-                    <a:pt x="660181" y="0"/>
-                  </a:lnTo>
-                  <a:lnTo>
-                    <a:pt x="660181" y="931574"/>
-                  </a:lnTo>
-                  <a:lnTo>
-                    <a:pt x="0" y="931574"/>
-                  </a:lnTo>
-                  <a:close/>
-                </a:path>
-              </a:pathLst>
-            </a:custGeom>
-            <a:blipFill>
-              <a:blip r:embed="rId6"/>
-              <a:stretch>
-                <a:fillRect l="-44072" t="0" r="-44072" b="0"/>
-              </a:stretch>
-            </a:blipFill>
-          </p:spPr>
-        </p:sp>
-      </p:grpSp>
-      <p:sp>
-        <p:nvSpPr>
-          <p:cNvPr name="TextBox 9" id="9"/>
-          <p:cNvSpPr txBox="true"/>
-          <p:nvPr/>
-        </p:nvSpPr>
-        <p:spPr>
-          <a:xfrm rot="0">
-            <a:off x="9449807" y="2163114"/>
-            <a:ext cx="7616279" cy="1167826"/>
-          </a:xfrm>
-          <a:prstGeom prst="rect">
-            <a:avLst/>
-          </a:prstGeom>
-        </p:spPr>
-        <p:txBody>
-          <a:bodyPr anchor="t" rtlCol="false" tIns="0" lIns="0" bIns="0" rIns="0">
-            <a:spAutoFit/>
-          </a:bodyPr>
-          <a:lstStyle/>
-          <a:p>
-            <a:pPr algn="l">
-              <a:lnSpc>
-                <a:spcPts val="8936"/>
-              </a:lnSpc>
-              <a:spcBef>
-                <a:spcPct val="0"/>
-              </a:spcBef>
-            </a:pPr>
-            <a:r>
-              <a:rPr lang="en-US" b="true" sz="8430">
-                <a:solidFill>
-                  <a:srgbClr val="84E3F8"/>
-                </a:solidFill>
-                <a:latin typeface="TT Lakes Neue Bold"/>
-                <a:ea typeface="TT Lakes Neue Bold"/>
-                <a:cs typeface="TT Lakes Neue Bold"/>
-                <a:sym typeface="TT Lakes Neue Bold"/>
-              </a:rPr>
-              <a:t>NEXT STEPS</a:t>
-            </a:r>
-          </a:p>
-        </p:txBody>
-      </p:sp>
-      <p:sp>
-        <p:nvSpPr>
-          <p:cNvPr name="TextBox 10" id="10"/>
-          <p:cNvSpPr txBox="true"/>
-          <p:nvPr/>
-        </p:nvSpPr>
-        <p:spPr>
-          <a:xfrm rot="0">
-            <a:off x="16175678" y="1560323"/>
-            <a:ext cx="1418817" cy="263273"/>
-          </a:xfrm>
-          <a:prstGeom prst="rect">
-            <a:avLst/>
-          </a:prstGeom>
-        </p:spPr>
-        <p:txBody>
-          <a:bodyPr anchor="t" rtlCol="false" tIns="0" lIns="0" bIns="0" rIns="0">
-            <a:spAutoFit/>
-          </a:bodyPr>
-          <a:lstStyle/>
-          <a:p>
-            <a:pPr algn="l">
-              <a:lnSpc>
-                <a:spcPts val="2067"/>
-              </a:lnSpc>
-              <a:spcBef>
-                <a:spcPct val="0"/>
-              </a:spcBef>
-            </a:pPr>
-            <a:r>
-              <a:rPr lang="en-US" sz="1950">
-                <a:solidFill>
-                  <a:srgbClr val="FFFFFF"/>
-                </a:solidFill>
-                <a:latin typeface="TT Lakes Neue"/>
-                <a:ea typeface="TT Lakes Neue"/>
-                <a:cs typeface="TT Lakes Neue"/>
-                <a:sym typeface="TT Lakes Neue"/>
-              </a:rPr>
-              <a:t>PAGE 09</a:t>
-            </a:r>
-          </a:p>
-        </p:txBody>
-      </p:sp>
-      <p:sp>
-        <p:nvSpPr>
-          <p:cNvPr name="TextBox 11" id="11"/>
-          <p:cNvSpPr txBox="true"/>
-          <p:nvPr/>
-        </p:nvSpPr>
-        <p:spPr>
-          <a:xfrm rot="0">
-            <a:off x="9449807" y="4372030"/>
-            <a:ext cx="7284546" cy="846216"/>
-          </a:xfrm>
-          <a:prstGeom prst="rect">
-            <a:avLst/>
-          </a:prstGeom>
-        </p:spPr>
-        <p:txBody>
-          <a:bodyPr anchor="t" rtlCol="false" tIns="0" lIns="0" bIns="0" rIns="0">
-            <a:spAutoFit/>
-          </a:bodyPr>
-          <a:lstStyle/>
-          <a:p>
-            <a:pPr algn="l">
-              <a:lnSpc>
-                <a:spcPts val="2181"/>
-              </a:lnSpc>
-            </a:pPr>
-            <a:r>
-              <a:rPr lang="en-US" sz="2058" b="true">
-                <a:solidFill>
-                  <a:srgbClr val="FFFFFF"/>
-                </a:solidFill>
-                <a:latin typeface="Raleway Bold"/>
-                <a:ea typeface="Raleway Bold"/>
-                <a:cs typeface="Raleway Bold"/>
-                <a:sym typeface="Raleway Bold"/>
-              </a:rPr>
-              <a:t>Code code code</a:t>
-            </a:r>
-          </a:p>
-          <a:p>
-            <a:pPr algn="l">
-              <a:lnSpc>
-                <a:spcPts val="2181"/>
-              </a:lnSpc>
-            </a:pPr>
-          </a:p>
-          <a:p>
-            <a:pPr algn="l">
-              <a:lnSpc>
-                <a:spcPts val="2181"/>
-              </a:lnSpc>
-              <a:spcBef>
-                <a:spcPct val="0"/>
-              </a:spcBef>
-            </a:pPr>
-            <a:r>
-              <a:rPr lang="en-US" b="true" sz="2058">
-                <a:solidFill>
-                  <a:srgbClr val="FFFFFF"/>
-                </a:solidFill>
-                <a:latin typeface="Raleway Bold"/>
-                <a:ea typeface="Raleway Bold"/>
-                <a:cs typeface="Raleway Bold"/>
-                <a:sym typeface="Raleway Bold"/>
-              </a:rPr>
-              <a:t>Get access to HPC</a:t>
-            </a:r>
-          </a:p>
-        </p:txBody>
-      </p:sp>
-      <p:sp>
-        <p:nvSpPr>
-          <p:cNvPr name="TextBox 12" id="12"/>
           <p:cNvSpPr txBox="true"/>
           <p:nvPr/>
         </p:nvSpPr>

</xml_diff>